<commit_message>
added video on iterators for your objects
</commit_message>
<xml_diff>
--- a/semaine4/CO12AL-W4-VIDEO09-SLIDE01.pptx
+++ b/semaine4/CO12AL-W4-VIDEO09-SLIDE01.pptx
@@ -18,8 +18,8 @@
     <p:sldId id="917" r:id="rId6"/>
     <p:sldId id="910" r:id="rId7"/>
     <p:sldId id="918" r:id="rId8"/>
-    <p:sldId id="919" r:id="rId9"/>
-    <p:sldId id="920" r:id="rId10"/>
+    <p:sldId id="920" r:id="rId9"/>
+    <p:sldId id="919" r:id="rId10"/>
   </p:sldIdLst>
   <p:sldSz cx="12192000" cy="6858000"/>
   <p:notesSz cx="7099300" cy="10234613"/>
@@ -160,8 +160,8 @@
             <p14:sldId id="917"/>
             <p14:sldId id="910"/>
             <p14:sldId id="918"/>
+            <p14:sldId id="920"/>
             <p14:sldId id="919"/>
-            <p14:sldId id="920"/>
           </p14:sldIdLst>
         </p14:section>
       </p14:sectionLst>
@@ -1445,14 +1445,6 @@
           <a:bodyPr/>
           <a:lstStyle/>
           <a:p>
-            <a:r>
-              <a:rPr lang="fr-FR" dirty="0" smtClean="0"/>
-              <a:t>Une</a:t>
-            </a:r>
-            <a:r>
-              <a:rPr lang="fr-FR" baseline="0" dirty="0" smtClean="0"/>
-              <a:t> variable assignée localement à un module (en dehors de toutes fonctions ou classes) est à la fois locale au module et globale. Elle est accessible depuis n’importe où dans le module</a:t>
-            </a:r>
             <a:endParaRPr lang="fr-FR" dirty="0"/>
           </a:p>
         </p:txBody>
@@ -1543,14 +1535,6 @@
           <a:bodyPr/>
           <a:lstStyle/>
           <a:p>
-            <a:r>
-              <a:rPr lang="fr-FR" dirty="0" smtClean="0"/>
-              <a:t>Une</a:t>
-            </a:r>
-            <a:r>
-              <a:rPr lang="fr-FR" baseline="0" dirty="0" smtClean="0"/>
-              <a:t> variable assignée localement à un module (en dehors de toutes fonctions ou classes) est à la fois locale au module et globale. Elle est accessible depuis n’importe où dans le module</a:t>
-            </a:r>
             <a:endParaRPr lang="fr-FR" dirty="0"/>
           </a:p>
         </p:txBody>
@@ -1641,14 +1625,6 @@
           <a:bodyPr/>
           <a:lstStyle/>
           <a:p>
-            <a:r>
-              <a:rPr lang="fr-FR" dirty="0" smtClean="0"/>
-              <a:t>Une</a:t>
-            </a:r>
-            <a:r>
-              <a:rPr lang="fr-FR" baseline="0" dirty="0" smtClean="0"/>
-              <a:t> variable assignée localement à un module (en dehors de toutes fonctions ou classes) est à la fois locale au module et globale. Elle est accessible depuis n’importe où dans le module</a:t>
-            </a:r>
             <a:endParaRPr lang="fr-FR" dirty="0"/>
           </a:p>
         </p:txBody>
@@ -1685,7 +1661,7 @@
     </p:spTree>
     <p:extLst>
       <p:ext uri="{BB962C8B-B14F-4D97-AF65-F5344CB8AC3E}">
-        <p14:creationId xmlns:p14="http://schemas.microsoft.com/office/powerpoint/2010/main" val="3281148113"/>
+        <p14:creationId xmlns:p14="http://schemas.microsoft.com/office/powerpoint/2010/main" val="3692340901"/>
       </p:ext>
     </p:extLst>
   </p:cSld>
@@ -1739,14 +1715,6 @@
           <a:bodyPr/>
           <a:lstStyle/>
           <a:p>
-            <a:r>
-              <a:rPr lang="fr-FR" dirty="0" smtClean="0"/>
-              <a:t>Une</a:t>
-            </a:r>
-            <a:r>
-              <a:rPr lang="fr-FR" baseline="0" dirty="0" smtClean="0"/>
-              <a:t> variable assignée localement à un module (en dehors de toutes fonctions ou classes) est à la fois locale au module et globale. Elle est accessible depuis n’importe où dans le module</a:t>
-            </a:r>
             <a:endParaRPr lang="fr-FR" dirty="0"/>
           </a:p>
         </p:txBody>
@@ -1783,7 +1751,7 @@
     </p:spTree>
     <p:extLst>
       <p:ext uri="{BB962C8B-B14F-4D97-AF65-F5344CB8AC3E}">
-        <p14:creationId xmlns:p14="http://schemas.microsoft.com/office/powerpoint/2010/main" val="3692340901"/>
+        <p14:creationId xmlns:p14="http://schemas.microsoft.com/office/powerpoint/2010/main" val="3281148113"/>
       </p:ext>
     </p:extLst>
   </p:cSld>
@@ -5837,6 +5805,7 @@
             </a:pPr>
             <a:r>
               <a:rPr lang="fr-FR" sz="3600" dirty="0" smtClean="0">
+                <a:latin typeface="Courier New" panose="02070309020205020404" pitchFamily="49" charset="0"/>
                 <a:cs typeface="Courier New" panose="02070309020205020404" pitchFamily="49" charset="0"/>
                 <a:sym typeface="Wingdings" panose="05000000000000000000" pitchFamily="2" charset="2"/>
               </a:rPr>
@@ -5847,6 +5816,7 @@
                 <a:solidFill>
                   <a:srgbClr val="FF0000"/>
                 </a:solidFill>
+                <a:latin typeface="Courier New" panose="02070309020205020404" pitchFamily="49" charset="0"/>
                 <a:cs typeface="Courier New" panose="02070309020205020404" pitchFamily="49" charset="0"/>
                 <a:sym typeface="Wingdings" panose="05000000000000000000" pitchFamily="2" charset="2"/>
               </a:rPr>
@@ -5854,6 +5824,7 @@
             </a:r>
             <a:r>
               <a:rPr lang="fr-FR" sz="3600" dirty="0" smtClean="0">
+                <a:latin typeface="Courier New" panose="02070309020205020404" pitchFamily="49" charset="0"/>
                 <a:cs typeface="Courier New" panose="02070309020205020404" pitchFamily="49" charset="0"/>
                 <a:sym typeface="Wingdings" panose="05000000000000000000" pitchFamily="2" charset="2"/>
               </a:rPr>
@@ -6590,10 +6561,6 @@
               </a:rPr>
               <a:t>	</a:t>
             </a:r>
-            <a:endParaRPr lang="fr-FR" sz="4000" dirty="0" smtClean="0">
-              <a:cs typeface="Courier New" panose="02070309020205020404" pitchFamily="49" charset="0"/>
-              <a:sym typeface="Wingdings" panose="05000000000000000000" pitchFamily="2" charset="2"/>
-            </a:endParaRPr>
           </a:p>
         </p:txBody>
       </p:sp>
@@ -8397,93 +8364,58 @@
             <a:pPr marL="0" indent="0">
               <a:buNone/>
             </a:pPr>
+            <a:endParaRPr lang="en-US" sz="2400" dirty="0" smtClean="0">
+              <a:latin typeface="Courier New" panose="02070309020205020404" pitchFamily="49" charset="0"/>
+              <a:cs typeface="Courier New" panose="02070309020205020404" pitchFamily="49" charset="0"/>
+              <a:sym typeface="Wingdings" panose="05000000000000000000" pitchFamily="2" charset="2"/>
+            </a:endParaRPr>
+          </a:p>
+          <a:p>
+            <a:pPr marL="0" indent="0">
+              <a:buNone/>
+            </a:pPr>
+            <a:r>
+              <a:rPr lang="en-US" sz="2400" dirty="0" smtClean="0">
+                <a:latin typeface="Courier New" panose="02070309020205020404" pitchFamily="49" charset="0"/>
+                <a:cs typeface="Courier New" panose="02070309020205020404" pitchFamily="49" charset="0"/>
+                <a:sym typeface="Wingdings" panose="05000000000000000000" pitchFamily="2" charset="2"/>
+              </a:rPr>
+              <a:t>f</a:t>
+            </a:r>
             <a:r>
               <a:rPr lang="en-US" sz="2400" dirty="0">
                 <a:latin typeface="Courier New" panose="02070309020205020404" pitchFamily="49" charset="0"/>
                 <a:cs typeface="Courier New" panose="02070309020205020404" pitchFamily="49" charset="0"/>
                 <a:sym typeface="Wingdings" panose="05000000000000000000" pitchFamily="2" charset="2"/>
               </a:rPr>
-              <a:t>    </a:t>
-            </a:r>
-            <a:r>
-              <a:rPr lang="en-US" sz="2400" dirty="0" err="1">
-                <a:latin typeface="Courier New" panose="02070309020205020404" pitchFamily="49" charset="0"/>
-                <a:cs typeface="Courier New" panose="02070309020205020404" pitchFamily="49" charset="0"/>
-                <a:sym typeface="Wingdings" panose="05000000000000000000" pitchFamily="2" charset="2"/>
-              </a:rPr>
-              <a:t>def</a:t>
-            </a:r>
+              <a:t>()</a:t>
+            </a:r>
+          </a:p>
+          <a:p>
+            <a:pPr marL="0" indent="0">
+              <a:buNone/>
+            </a:pPr>
             <a:r>
               <a:rPr lang="en-US" sz="2400" dirty="0">
                 <a:latin typeface="Courier New" panose="02070309020205020404" pitchFamily="49" charset="0"/>
                 <a:cs typeface="Courier New" panose="02070309020205020404" pitchFamily="49" charset="0"/>
                 <a:sym typeface="Wingdings" panose="05000000000000000000" pitchFamily="2" charset="2"/>
               </a:rPr>
-              <a:t> g(self):</a:t>
-            </a:r>
-          </a:p>
-          <a:p>
-            <a:pPr marL="0" indent="0">
-              <a:buNone/>
-            </a:pPr>
-            <a:r>
-              <a:rPr lang="en-US" sz="2400" dirty="0">
+              <a:t>C</a:t>
+            </a:r>
+            <a:r>
+              <a:rPr lang="en-US" sz="2400" dirty="0" smtClean="0">
                 <a:latin typeface="Courier New" panose="02070309020205020404" pitchFamily="49" charset="0"/>
                 <a:cs typeface="Courier New" panose="02070309020205020404" pitchFamily="49" charset="0"/>
                 <a:sym typeface="Wingdings" panose="05000000000000000000" pitchFamily="2" charset="2"/>
               </a:rPr>
-              <a:t>        </a:t>
-            </a:r>
-            <a:r>
-              <a:rPr lang="en-US" sz="2400" dirty="0">
-                <a:solidFill>
-                  <a:srgbClr val="FF0000"/>
-                </a:solidFill>
-                <a:latin typeface="Courier New" panose="02070309020205020404" pitchFamily="49" charset="0"/>
-                <a:cs typeface="Courier New" panose="02070309020205020404" pitchFamily="49" charset="0"/>
-                <a:sym typeface="Wingdings" panose="05000000000000000000" pitchFamily="2" charset="2"/>
-              </a:rPr>
-              <a:t>global a</a:t>
-            </a:r>
-          </a:p>
-          <a:p>
-            <a:pPr marL="0" indent="0">
-              <a:buNone/>
-            </a:pPr>
-            <a:r>
-              <a:rPr lang="en-US" sz="2400" dirty="0">
-                <a:latin typeface="Courier New" panose="02070309020205020404" pitchFamily="49" charset="0"/>
-                <a:cs typeface="Courier New" panose="02070309020205020404" pitchFamily="49" charset="0"/>
-                <a:sym typeface="Wingdings" panose="05000000000000000000" pitchFamily="2" charset="2"/>
-              </a:rPr>
-              <a:t>        a = 4</a:t>
-            </a:r>
-          </a:p>
-          <a:p>
-            <a:pPr marL="0" indent="0">
-              <a:buNone/>
-            </a:pPr>
-            <a:r>
-              <a:rPr lang="en-US" sz="2400" dirty="0">
-                <a:latin typeface="Courier New" panose="02070309020205020404" pitchFamily="49" charset="0"/>
-                <a:cs typeface="Courier New" panose="02070309020205020404" pitchFamily="49" charset="0"/>
-                <a:sym typeface="Wingdings" panose="05000000000000000000" pitchFamily="2" charset="2"/>
-              </a:rPr>
-              <a:t>f()</a:t>
-            </a:r>
-          </a:p>
-          <a:p>
-            <a:pPr marL="0" indent="0">
-              <a:buNone/>
-            </a:pPr>
-            <a:r>
-              <a:rPr lang="en-US" sz="2400" dirty="0">
-                <a:latin typeface="Courier New" panose="02070309020205020404" pitchFamily="49" charset="0"/>
-                <a:cs typeface="Courier New" panose="02070309020205020404" pitchFamily="49" charset="0"/>
-                <a:sym typeface="Wingdings" panose="05000000000000000000" pitchFamily="2" charset="2"/>
-              </a:rPr>
-              <a:t>C().g()</a:t>
-            </a:r>
+              <a:t>()</a:t>
+            </a:r>
+            <a:endParaRPr lang="en-US" sz="2400" dirty="0">
+              <a:latin typeface="Courier New" panose="02070309020205020404" pitchFamily="49" charset="0"/>
+              <a:cs typeface="Courier New" panose="02070309020205020404" pitchFamily="49" charset="0"/>
+              <a:sym typeface="Wingdings" panose="05000000000000000000" pitchFamily="2" charset="2"/>
+            </a:endParaRPr>
           </a:p>
           <a:p>
             <a:pPr marL="0" indent="0">
@@ -8721,7 +8653,7 @@
                 <a:cs typeface="Courier New" panose="02070309020205020404" pitchFamily="49" charset="0"/>
                 <a:sym typeface="Wingdings" panose="05000000000000000000" pitchFamily="2" charset="2"/>
               </a:rPr>
-              <a:t>4</a:t>
+              <a:t>1</a:t>
             </a:r>
             <a:endParaRPr lang="fr-FR" sz="2400" kern="0" dirty="0" smtClean="0">
               <a:latin typeface="Courier New" panose="02070309020205020404" pitchFamily="49" charset="0"/>
@@ -8742,11 +8674,6 @@
               </a:rPr>
               <a:t>&gt;&gt;&gt;</a:t>
             </a:r>
-            <a:endParaRPr lang="fr-FR" sz="2400" kern="0" dirty="0" smtClean="0">
-              <a:latin typeface="Courier New" panose="02070309020205020404" pitchFamily="49" charset="0"/>
-              <a:cs typeface="Courier New" panose="02070309020205020404" pitchFamily="49" charset="0"/>
-              <a:sym typeface="Wingdings" panose="05000000000000000000" pitchFamily="2" charset="2"/>
-            </a:endParaRPr>
           </a:p>
         </p:txBody>
       </p:sp>
@@ -8889,10 +8816,13 @@
                             </p:stCondLst>
                             <p:childTnLst>
                               <p:par>
-                                <p:cTn id="5" presetID="10" presetClass="entr" presetSubtype="0" fill="hold" nodeType="clickEffect">
+                                <p:cTn id="5" presetID="1" presetClass="entr" presetSubtype="0" fill="hold" nodeType="clickEffect">
                                   <p:stCondLst>
                                     <p:cond delay="0"/>
                                   </p:stCondLst>
+                                  <p:iterate type="lt">
+                                    <p:tmAbs val="100"/>
+                                  </p:iterate>
                                   <p:childTnLst>
                                     <p:set>
                                       <p:cBhvr>
@@ -8916,18 +8846,6 @@
                                         <p:strVal val="visible"/>
                                       </p:to>
                                     </p:set>
-                                    <p:animEffect transition="in" filter="fade">
-                                      <p:cBhvr>
-                                        <p:cTn id="7" dur="500"/>
-                                        <p:tgtEl>
-                                          <p:spTgt spid="3">
-                                            <p:txEl>
-                                              <p:pRg st="0" end="0"/>
-                                            </p:txEl>
-                                          </p:spTgt>
-                                        </p:tgtEl>
-                                      </p:cBhvr>
-                                    </p:animEffect>
                                   </p:childTnLst>
                                 </p:cTn>
                               </p:par>
@@ -8938,26 +8856,29 @@
                     </p:cTn>
                   </p:par>
                   <p:par>
-                    <p:cTn id="8" fill="hold">
+                    <p:cTn id="7" fill="hold">
                       <p:stCondLst>
                         <p:cond delay="indefinite"/>
                       </p:stCondLst>
                       <p:childTnLst>
                         <p:par>
-                          <p:cTn id="9" fill="hold">
+                          <p:cTn id="8" fill="hold">
                             <p:stCondLst>
                               <p:cond delay="0"/>
                             </p:stCondLst>
                             <p:childTnLst>
                               <p:par>
-                                <p:cTn id="10" presetID="10" presetClass="entr" presetSubtype="0" fill="hold" nodeType="clickEffect">
+                                <p:cTn id="9" presetID="1" presetClass="entr" presetSubtype="0" fill="hold" nodeType="clickEffect">
                                   <p:stCondLst>
                                     <p:cond delay="0"/>
                                   </p:stCondLst>
+                                  <p:iterate type="lt">
+                                    <p:tmAbs val="100"/>
+                                  </p:iterate>
                                   <p:childTnLst>
                                     <p:set>
                                       <p:cBhvr>
-                                        <p:cTn id="11" dur="1" fill="hold">
+                                        <p:cTn id="10" dur="1" fill="hold">
                                           <p:stCondLst>
                                             <p:cond delay="0"/>
                                           </p:stCondLst>
@@ -8977,30 +8898,30 @@
                                         <p:strVal val="visible"/>
                                       </p:to>
                                     </p:set>
-                                    <p:animEffect transition="in" filter="fade">
-                                      <p:cBhvr>
-                                        <p:cTn id="12" dur="500"/>
-                                        <p:tgtEl>
-                                          <p:spTgt spid="3">
-                                            <p:txEl>
-                                              <p:pRg st="1" end="1"/>
-                                            </p:txEl>
-                                          </p:spTgt>
-                                        </p:tgtEl>
-                                      </p:cBhvr>
-                                    </p:animEffect>
                                   </p:childTnLst>
                                 </p:cTn>
                               </p:par>
+                            </p:childTnLst>
+                          </p:cTn>
+                        </p:par>
+                        <p:par>
+                          <p:cTn id="11" fill="hold">
+                            <p:stCondLst>
+                              <p:cond delay="601"/>
+                            </p:stCondLst>
+                            <p:childTnLst>
                               <p:par>
-                                <p:cTn id="13" presetID="10" presetClass="entr" presetSubtype="0" fill="hold" nodeType="withEffect">
+                                <p:cTn id="12" presetID="1" presetClass="entr" presetSubtype="0" fill="hold" nodeType="afterEffect">
                                   <p:stCondLst>
                                     <p:cond delay="0"/>
                                   </p:stCondLst>
+                                  <p:iterate type="lt">
+                                    <p:tmAbs val="100"/>
+                                  </p:iterate>
                                   <p:childTnLst>
                                     <p:set>
                                       <p:cBhvr>
-                                        <p:cTn id="14" dur="1" fill="hold">
+                                        <p:cTn id="13" dur="1" fill="hold">
                                           <p:stCondLst>
                                             <p:cond delay="0"/>
                                           </p:stCondLst>
@@ -9020,18 +8941,6 @@
                                         <p:strVal val="visible"/>
                                       </p:to>
                                     </p:set>
-                                    <p:animEffect transition="in" filter="fade">
-                                      <p:cBhvr>
-                                        <p:cTn id="15" dur="500"/>
-                                        <p:tgtEl>
-                                          <p:spTgt spid="3">
-                                            <p:txEl>
-                                              <p:pRg st="2" end="2"/>
-                                            </p:txEl>
-                                          </p:spTgt>
-                                        </p:tgtEl>
-                                      </p:cBhvr>
-                                    </p:animEffect>
                                   </p:childTnLst>
                                 </p:cTn>
                               </p:par>
@@ -9042,26 +8951,29 @@
                     </p:cTn>
                   </p:par>
                   <p:par>
-                    <p:cTn id="16" fill="hold">
+                    <p:cTn id="14" fill="hold">
                       <p:stCondLst>
                         <p:cond delay="indefinite"/>
                       </p:stCondLst>
                       <p:childTnLst>
                         <p:par>
-                          <p:cTn id="17" fill="hold">
+                          <p:cTn id="15" fill="hold">
                             <p:stCondLst>
                               <p:cond delay="0"/>
                             </p:stCondLst>
                             <p:childTnLst>
                               <p:par>
-                                <p:cTn id="18" presetID="10" presetClass="entr" presetSubtype="0" fill="hold" nodeType="clickEffect">
+                                <p:cTn id="16" presetID="1" presetClass="entr" presetSubtype="0" fill="hold" nodeType="clickEffect">
                                   <p:stCondLst>
                                     <p:cond delay="0"/>
                                   </p:stCondLst>
+                                  <p:iterate type="lt">
+                                    <p:tmAbs val="100"/>
+                                  </p:iterate>
                                   <p:childTnLst>
                                     <p:set>
                                       <p:cBhvr>
-                                        <p:cTn id="19" dur="1" fill="hold">
+                                        <p:cTn id="17" dur="1" fill="hold">
                                           <p:stCondLst>
                                             <p:cond delay="0"/>
                                           </p:stCondLst>
@@ -9081,30 +8993,30 @@
                                         <p:strVal val="visible"/>
                                       </p:to>
                                     </p:set>
-                                    <p:animEffect transition="in" filter="fade">
-                                      <p:cBhvr>
-                                        <p:cTn id="20" dur="500"/>
-                                        <p:tgtEl>
-                                          <p:spTgt spid="3">
-                                            <p:txEl>
-                                              <p:pRg st="4" end="4"/>
-                                            </p:txEl>
-                                          </p:spTgt>
-                                        </p:tgtEl>
-                                      </p:cBhvr>
-                                    </p:animEffect>
                                   </p:childTnLst>
                                 </p:cTn>
                               </p:par>
+                            </p:childTnLst>
+                          </p:cTn>
+                        </p:par>
+                        <p:par>
+                          <p:cTn id="18" fill="hold">
+                            <p:stCondLst>
+                              <p:cond delay="801"/>
+                            </p:stCondLst>
+                            <p:childTnLst>
                               <p:par>
-                                <p:cTn id="21" presetID="10" presetClass="entr" presetSubtype="0" fill="hold" nodeType="withEffect">
+                                <p:cTn id="19" presetID="1" presetClass="entr" presetSubtype="0" fill="hold" nodeType="afterEffect">
                                   <p:stCondLst>
                                     <p:cond delay="0"/>
                                   </p:stCondLst>
+                                  <p:iterate type="lt">
+                                    <p:tmAbs val="100"/>
+                                  </p:iterate>
                                   <p:childTnLst>
                                     <p:set>
                                       <p:cBhvr>
-                                        <p:cTn id="22" dur="1" fill="hold">
+                                        <p:cTn id="20" dur="1" fill="hold">
                                           <p:stCondLst>
                                             <p:cond delay="0"/>
                                           </p:stCondLst>
@@ -9124,18 +9036,6 @@
                                         <p:strVal val="visible"/>
                                       </p:to>
                                     </p:set>
-                                    <p:animEffect transition="in" filter="fade">
-                                      <p:cBhvr>
-                                        <p:cTn id="23" dur="500"/>
-                                        <p:tgtEl>
-                                          <p:spTgt spid="3">
-                                            <p:txEl>
-                                              <p:pRg st="5" end="5"/>
-                                            </p:txEl>
-                                          </p:spTgt>
-                                        </p:tgtEl>
-                                      </p:cBhvr>
-                                    </p:animEffect>
                                   </p:childTnLst>
                                 </p:cTn>
                               </p:par>
@@ -9146,69 +9046,29 @@
                     </p:cTn>
                   </p:par>
                   <p:par>
-                    <p:cTn id="24" fill="hold">
+                    <p:cTn id="21" fill="hold">
                       <p:stCondLst>
                         <p:cond delay="indefinite"/>
                       </p:stCondLst>
                       <p:childTnLst>
                         <p:par>
-                          <p:cTn id="25" fill="hold">
+                          <p:cTn id="22" fill="hold">
                             <p:stCondLst>
                               <p:cond delay="0"/>
                             </p:stCondLst>
                             <p:childTnLst>
                               <p:par>
-                                <p:cTn id="26" presetID="10" presetClass="entr" presetSubtype="0" fill="hold" nodeType="clickEffect">
+                                <p:cTn id="23" presetID="1" presetClass="entr" presetSubtype="0" fill="hold" nodeType="clickEffect">
                                   <p:stCondLst>
                                     <p:cond delay="0"/>
                                   </p:stCondLst>
+                                  <p:iterate type="lt">
+                                    <p:tmAbs val="100"/>
+                                  </p:iterate>
                                   <p:childTnLst>
                                     <p:set>
                                       <p:cBhvr>
-                                        <p:cTn id="27" dur="1" fill="hold">
-                                          <p:stCondLst>
-                                            <p:cond delay="0"/>
-                                          </p:stCondLst>
-                                        </p:cTn>
-                                        <p:tgtEl>
-                                          <p:spTgt spid="3">
-                                            <p:txEl>
-                                              <p:pRg st="6" end="6"/>
-                                            </p:txEl>
-                                          </p:spTgt>
-                                        </p:tgtEl>
-                                        <p:attrNameLst>
-                                          <p:attrName>style.visibility</p:attrName>
-                                        </p:attrNameLst>
-                                      </p:cBhvr>
-                                      <p:to>
-                                        <p:strVal val="visible"/>
-                                      </p:to>
-                                    </p:set>
-                                    <p:animEffect transition="in" filter="fade">
-                                      <p:cBhvr>
-                                        <p:cTn id="28" dur="500"/>
-                                        <p:tgtEl>
-                                          <p:spTgt spid="3">
-                                            <p:txEl>
-                                              <p:pRg st="6" end="6"/>
-                                            </p:txEl>
-                                          </p:spTgt>
-                                        </p:tgtEl>
-                                      </p:cBhvr>
-                                    </p:animEffect>
-                                  </p:childTnLst>
-                                </p:cTn>
-                              </p:par>
-                              <p:par>
-                                <p:cTn id="29" presetID="10" presetClass="entr" presetSubtype="0" fill="hold" nodeType="withEffect">
-                                  <p:stCondLst>
-                                    <p:cond delay="0"/>
-                                  </p:stCondLst>
-                                  <p:childTnLst>
-                                    <p:set>
-                                      <p:cBhvr>
-                                        <p:cTn id="30" dur="1" fill="hold">
+                                        <p:cTn id="24" dur="1" fill="hold">
                                           <p:stCondLst>
                                             <p:cond delay="0"/>
                                           </p:stCondLst>
@@ -9228,30 +9088,39 @@
                                         <p:strVal val="visible"/>
                                       </p:to>
                                     </p:set>
-                                    <p:animEffect transition="in" filter="fade">
-                                      <p:cBhvr>
-                                        <p:cTn id="31" dur="500"/>
-                                        <p:tgtEl>
-                                          <p:spTgt spid="3">
-                                            <p:txEl>
-                                              <p:pRg st="7" end="7"/>
-                                            </p:txEl>
-                                          </p:spTgt>
-                                        </p:tgtEl>
-                                      </p:cBhvr>
-                                    </p:animEffect>
                                   </p:childTnLst>
                                 </p:cTn>
                               </p:par>
+                            </p:childTnLst>
+                          </p:cTn>
+                        </p:par>
+                      </p:childTnLst>
+                    </p:cTn>
+                  </p:par>
+                  <p:par>
+                    <p:cTn id="25" fill="hold">
+                      <p:stCondLst>
+                        <p:cond delay="indefinite"/>
+                      </p:stCondLst>
+                      <p:childTnLst>
+                        <p:par>
+                          <p:cTn id="26" fill="hold">
+                            <p:stCondLst>
+                              <p:cond delay="0"/>
+                            </p:stCondLst>
+                            <p:childTnLst>
                               <p:par>
-                                <p:cTn id="32" presetID="10" presetClass="entr" presetSubtype="0" fill="hold" nodeType="withEffect">
+                                <p:cTn id="27" presetID="1" presetClass="entr" presetSubtype="0" fill="hold" nodeType="clickEffect">
                                   <p:stCondLst>
                                     <p:cond delay="0"/>
                                   </p:stCondLst>
+                                  <p:iterate type="lt">
+                                    <p:tmAbs val="100"/>
+                                  </p:iterate>
                                   <p:childTnLst>
                                     <p:set>
                                       <p:cBhvr>
-                                        <p:cTn id="33" dur="1" fill="hold">
+                                        <p:cTn id="28" dur="1" fill="hold">
                                           <p:stCondLst>
                                             <p:cond delay="0"/>
                                           </p:stCondLst>
@@ -9271,18 +9140,6 @@
                                         <p:strVal val="visible"/>
                                       </p:to>
                                     </p:set>
-                                    <p:animEffect transition="in" filter="fade">
-                                      <p:cBhvr>
-                                        <p:cTn id="34" dur="500"/>
-                                        <p:tgtEl>
-                                          <p:spTgt spid="3">
-                                            <p:txEl>
-                                              <p:pRg st="8" end="8"/>
-                                            </p:txEl>
-                                          </p:spTgt>
-                                        </p:tgtEl>
-                                      </p:cBhvr>
-                                    </p:animEffect>
                                   </p:childTnLst>
                                 </p:cTn>
                               </p:par>
@@ -9293,26 +9150,29 @@
                     </p:cTn>
                   </p:par>
                   <p:par>
-                    <p:cTn id="35" fill="hold">
+                    <p:cTn id="29" fill="hold">
                       <p:stCondLst>
                         <p:cond delay="indefinite"/>
                       </p:stCondLst>
                       <p:childTnLst>
                         <p:par>
-                          <p:cTn id="36" fill="hold">
+                          <p:cTn id="30" fill="hold">
                             <p:stCondLst>
                               <p:cond delay="0"/>
                             </p:stCondLst>
                             <p:childTnLst>
                               <p:par>
-                                <p:cTn id="37" presetID="10" presetClass="entr" presetSubtype="0" fill="hold" nodeType="clickEffect">
+                                <p:cTn id="31" presetID="1" presetClass="entr" presetSubtype="0" fill="hold" nodeType="clickEffect">
                                   <p:stCondLst>
                                     <p:cond delay="0"/>
                                   </p:stCondLst>
+                                  <p:iterate type="lt">
+                                    <p:tmAbs val="100"/>
+                                  </p:iterate>
                                   <p:childTnLst>
                                     <p:set>
                                       <p:cBhvr>
-                                        <p:cTn id="38" dur="1" fill="hold">
+                                        <p:cTn id="32" dur="1" fill="hold">
                                           <p:stCondLst>
                                             <p:cond delay="0"/>
                                           </p:stCondLst>
@@ -9332,18 +9192,6 @@
                                         <p:strVal val="visible"/>
                                       </p:to>
                                     </p:set>
-                                    <p:animEffect transition="in" filter="fade">
-                                      <p:cBhvr>
-                                        <p:cTn id="39" dur="500"/>
-                                        <p:tgtEl>
-                                          <p:spTgt spid="3">
-                                            <p:txEl>
-                                              <p:pRg st="9" end="9"/>
-                                            </p:txEl>
-                                          </p:spTgt>
-                                        </p:tgtEl>
-                                      </p:cBhvr>
-                                    </p:animEffect>
                                   </p:childTnLst>
                                 </p:cTn>
                               </p:par>
@@ -9354,148 +9202,26 @@
                     </p:cTn>
                   </p:par>
                   <p:par>
-                    <p:cTn id="40" fill="hold">
+                    <p:cTn id="33" fill="hold">
                       <p:stCondLst>
                         <p:cond delay="indefinite"/>
                       </p:stCondLst>
                       <p:childTnLst>
                         <p:par>
-                          <p:cTn id="41" fill="hold">
+                          <p:cTn id="34" fill="hold">
                             <p:stCondLst>
                               <p:cond delay="0"/>
                             </p:stCondLst>
                             <p:childTnLst>
                               <p:par>
-                                <p:cTn id="42" presetID="10" presetClass="entr" presetSubtype="0" fill="hold" nodeType="clickEffect">
+                                <p:cTn id="35" presetID="10" presetClass="entr" presetSubtype="0" fill="hold" nodeType="clickEffect">
                                   <p:stCondLst>
                                     <p:cond delay="0"/>
                                   </p:stCondLst>
                                   <p:childTnLst>
                                     <p:set>
                                       <p:cBhvr>
-                                        <p:cTn id="43" dur="1" fill="hold">
-                                          <p:stCondLst>
-                                            <p:cond delay="0"/>
-                                          </p:stCondLst>
-                                        </p:cTn>
-                                        <p:tgtEl>
-                                          <p:spTgt spid="3">
-                                            <p:txEl>
-                                              <p:pRg st="10" end="10"/>
-                                            </p:txEl>
-                                          </p:spTgt>
-                                        </p:tgtEl>
-                                        <p:attrNameLst>
-                                          <p:attrName>style.visibility</p:attrName>
-                                        </p:attrNameLst>
-                                      </p:cBhvr>
-                                      <p:to>
-                                        <p:strVal val="visible"/>
-                                      </p:to>
-                                    </p:set>
-                                    <p:animEffect transition="in" filter="fade">
-                                      <p:cBhvr>
-                                        <p:cTn id="44" dur="500"/>
-                                        <p:tgtEl>
-                                          <p:spTgt spid="3">
-                                            <p:txEl>
-                                              <p:pRg st="10" end="10"/>
-                                            </p:txEl>
-                                          </p:spTgt>
-                                        </p:tgtEl>
-                                      </p:cBhvr>
-                                    </p:animEffect>
-                                  </p:childTnLst>
-                                </p:cTn>
-                              </p:par>
-                            </p:childTnLst>
-                          </p:cTn>
-                        </p:par>
-                      </p:childTnLst>
-                    </p:cTn>
-                  </p:par>
-                  <p:par>
-                    <p:cTn id="45" fill="hold">
-                      <p:stCondLst>
-                        <p:cond delay="indefinite"/>
-                      </p:stCondLst>
-                      <p:childTnLst>
-                        <p:par>
-                          <p:cTn id="46" fill="hold">
-                            <p:stCondLst>
-                              <p:cond delay="0"/>
-                            </p:stCondLst>
-                            <p:childTnLst>
-                              <p:par>
-                                <p:cTn id="47" presetID="10" presetClass="entr" presetSubtype="0" fill="hold" nodeType="clickEffect">
-                                  <p:stCondLst>
-                                    <p:cond delay="0"/>
-                                  </p:stCondLst>
-                                  <p:childTnLst>
-                                    <p:set>
-                                      <p:cBhvr>
-                                        <p:cTn id="48" dur="1" fill="hold">
-                                          <p:stCondLst>
-                                            <p:cond delay="0"/>
-                                          </p:stCondLst>
-                                        </p:cTn>
-                                        <p:tgtEl>
-                                          <p:spTgt spid="3">
-                                            <p:txEl>
-                                              <p:pRg st="11" end="11"/>
-                                            </p:txEl>
-                                          </p:spTgt>
-                                        </p:tgtEl>
-                                        <p:attrNameLst>
-                                          <p:attrName>style.visibility</p:attrName>
-                                        </p:attrNameLst>
-                                      </p:cBhvr>
-                                      <p:to>
-                                        <p:strVal val="visible"/>
-                                      </p:to>
-                                    </p:set>
-                                    <p:animEffect transition="in" filter="fade">
-                                      <p:cBhvr>
-                                        <p:cTn id="49" dur="500"/>
-                                        <p:tgtEl>
-                                          <p:spTgt spid="3">
-                                            <p:txEl>
-                                              <p:pRg st="11" end="11"/>
-                                            </p:txEl>
-                                          </p:spTgt>
-                                        </p:tgtEl>
-                                      </p:cBhvr>
-                                    </p:animEffect>
-                                  </p:childTnLst>
-                                </p:cTn>
-                              </p:par>
-                            </p:childTnLst>
-                          </p:cTn>
-                        </p:par>
-                      </p:childTnLst>
-                    </p:cTn>
-                  </p:par>
-                  <p:par>
-                    <p:cTn id="50" fill="hold">
-                      <p:stCondLst>
-                        <p:cond delay="indefinite"/>
-                      </p:stCondLst>
-                      <p:childTnLst>
-                        <p:par>
-                          <p:cTn id="51" fill="hold">
-                            <p:stCondLst>
-                              <p:cond delay="0"/>
-                            </p:stCondLst>
-                            <p:childTnLst>
-                              <p:par>
-                                <p:cTn id="52" presetID="10" presetClass="entr" presetSubtype="0" fill="hold" nodeType="clickEffect">
-                                  <p:stCondLst>
-                                    <p:cond delay="0"/>
-                                  </p:stCondLst>
-                                  <p:childTnLst>
-                                    <p:set>
-                                      <p:cBhvr>
-                                        <p:cTn id="53" dur="1" fill="hold">
+                                        <p:cTn id="36" dur="1" fill="hold">
                                           <p:stCondLst>
                                             <p:cond delay="0"/>
                                           </p:stCondLst>
@@ -9517,7 +9243,7 @@
                                     </p:set>
                                     <p:animEffect transition="in" filter="fade">
                                       <p:cBhvr>
-                                        <p:cTn id="54" dur="500"/>
+                                        <p:cTn id="37" dur="500"/>
                                         <p:tgtEl>
                                           <p:spTgt spid="4">
                                             <p:txEl>
@@ -9530,15 +9256,33 @@
                                   </p:childTnLst>
                                 </p:cTn>
                               </p:par>
+                            </p:childTnLst>
+                          </p:cTn>
+                        </p:par>
+                      </p:childTnLst>
+                    </p:cTn>
+                  </p:par>
+                  <p:par>
+                    <p:cTn id="38" fill="hold">
+                      <p:stCondLst>
+                        <p:cond delay="indefinite"/>
+                      </p:stCondLst>
+                      <p:childTnLst>
+                        <p:par>
+                          <p:cTn id="39" fill="hold">
+                            <p:stCondLst>
+                              <p:cond delay="0"/>
+                            </p:stCondLst>
+                            <p:childTnLst>
                               <p:par>
-                                <p:cTn id="55" presetID="10" presetClass="entr" presetSubtype="0" fill="hold" nodeType="withEffect">
+                                <p:cTn id="40" presetID="10" presetClass="entr" presetSubtype="0" fill="hold" nodeType="clickEffect">
                                   <p:stCondLst>
                                     <p:cond delay="0"/>
                                   </p:stCondLst>
                                   <p:childTnLst>
                                     <p:set>
                                       <p:cBhvr>
-                                        <p:cTn id="56" dur="1" fill="hold">
+                                        <p:cTn id="41" dur="1" fill="hold">
                                           <p:stCondLst>
                                             <p:cond delay="0"/>
                                           </p:stCondLst>
@@ -9560,7 +9304,7 @@
                                     </p:set>
                                     <p:animEffect transition="in" filter="fade">
                                       <p:cBhvr>
-                                        <p:cTn id="57" dur="500"/>
+                                        <p:cTn id="42" dur="500"/>
                                         <p:tgtEl>
                                           <p:spTgt spid="4">
                                             <p:txEl>
@@ -9574,14 +9318,14 @@
                                 </p:cTn>
                               </p:par>
                               <p:par>
-                                <p:cTn id="58" presetID="10" presetClass="entr" presetSubtype="0" fill="hold" nodeType="withEffect">
+                                <p:cTn id="43" presetID="10" presetClass="entr" presetSubtype="0" fill="hold" nodeType="withEffect">
                                   <p:stCondLst>
                                     <p:cond delay="0"/>
                                   </p:stCondLst>
                                   <p:childTnLst>
                                     <p:set>
                                       <p:cBhvr>
-                                        <p:cTn id="59" dur="1" fill="hold">
+                                        <p:cTn id="44" dur="1" fill="hold">
                                           <p:stCondLst>
                                             <p:cond delay="0"/>
                                           </p:stCondLst>
@@ -9603,7 +9347,7 @@
                                     </p:set>
                                     <p:animEffect transition="in" filter="fade">
                                       <p:cBhvr>
-                                        <p:cTn id="60" dur="500"/>
+                                        <p:cTn id="45" dur="500"/>
                                         <p:tgtEl>
                                           <p:spTgt spid="4">
                                             <p:txEl>
@@ -10169,9 +9913,6 @@
               </a:rPr>
               <a:t>G</a:t>
             </a:r>
-            <a:endParaRPr lang="fr-FR" sz="7200" dirty="0">
-              <a:latin typeface="Calibri" panose="020F0502020204030204" pitchFamily="34" charset="0"/>
-            </a:endParaRPr>
           </a:p>
         </p:txBody>
       </p:sp>
@@ -10206,10 +9947,13 @@
                             </p:stCondLst>
                             <p:childTnLst>
                               <p:par>
-                                <p:cTn id="5" presetID="10" presetClass="entr" presetSubtype="0" fill="hold" nodeType="clickEffect">
+                                <p:cTn id="5" presetID="1" presetClass="entr" presetSubtype="0" fill="hold" nodeType="clickEffect">
                                   <p:stCondLst>
                                     <p:cond delay="0"/>
                                   </p:stCondLst>
+                                  <p:iterate type="lt">
+                                    <p:tmAbs val="100"/>
+                                  </p:iterate>
                                   <p:childTnLst>
                                     <p:set>
                                       <p:cBhvr>
@@ -10233,18 +9977,6 @@
                                         <p:strVal val="visible"/>
                                       </p:to>
                                     </p:set>
-                                    <p:animEffect transition="in" filter="fade">
-                                      <p:cBhvr>
-                                        <p:cTn id="7" dur="500"/>
-                                        <p:tgtEl>
-                                          <p:spTgt spid="3">
-                                            <p:txEl>
-                                              <p:pRg st="0" end="0"/>
-                                            </p:txEl>
-                                          </p:spTgt>
-                                        </p:tgtEl>
-                                      </p:cBhvr>
-                                    </p:animEffect>
                                   </p:childTnLst>
                                 </p:cTn>
                               </p:par>
@@ -10255,26 +9987,29 @@
                     </p:cTn>
                   </p:par>
                   <p:par>
-                    <p:cTn id="8" fill="hold">
+                    <p:cTn id="7" fill="hold">
                       <p:stCondLst>
                         <p:cond delay="indefinite"/>
                       </p:stCondLst>
                       <p:childTnLst>
                         <p:par>
-                          <p:cTn id="9" fill="hold">
+                          <p:cTn id="8" fill="hold">
                             <p:stCondLst>
                               <p:cond delay="0"/>
                             </p:stCondLst>
                             <p:childTnLst>
                               <p:par>
-                                <p:cTn id="10" presetID="10" presetClass="entr" presetSubtype="0" fill="hold" nodeType="clickEffect">
+                                <p:cTn id="9" presetID="1" presetClass="entr" presetSubtype="0" fill="hold" nodeType="clickEffect">
                                   <p:stCondLst>
                                     <p:cond delay="0"/>
                                   </p:stCondLst>
+                                  <p:iterate type="lt">
+                                    <p:tmAbs val="100"/>
+                                  </p:iterate>
                                   <p:childTnLst>
                                     <p:set>
                                       <p:cBhvr>
-                                        <p:cTn id="11" dur="1" fill="hold">
+                                        <p:cTn id="10" dur="1" fill="hold">
                                           <p:stCondLst>
                                             <p:cond delay="0"/>
                                           </p:stCondLst>
@@ -10294,30 +10029,30 @@
                                         <p:strVal val="visible"/>
                                       </p:to>
                                     </p:set>
-                                    <p:animEffect transition="in" filter="fade">
-                                      <p:cBhvr>
-                                        <p:cTn id="12" dur="500"/>
-                                        <p:tgtEl>
-                                          <p:spTgt spid="3">
-                                            <p:txEl>
-                                              <p:pRg st="1" end="1"/>
-                                            </p:txEl>
-                                          </p:spTgt>
-                                        </p:tgtEl>
-                                      </p:cBhvr>
-                                    </p:animEffect>
                                   </p:childTnLst>
                                 </p:cTn>
                               </p:par>
+                            </p:childTnLst>
+                          </p:cTn>
+                        </p:par>
+                        <p:par>
+                          <p:cTn id="11" fill="hold">
+                            <p:stCondLst>
+                              <p:cond delay="601"/>
+                            </p:stCondLst>
+                            <p:childTnLst>
                               <p:par>
-                                <p:cTn id="13" presetID="10" presetClass="entr" presetSubtype="0" fill="hold" nodeType="withEffect">
+                                <p:cTn id="12" presetID="1" presetClass="entr" presetSubtype="0" fill="hold" nodeType="afterEffect">
                                   <p:stCondLst>
                                     <p:cond delay="0"/>
                                   </p:stCondLst>
+                                  <p:iterate type="lt">
+                                    <p:tmAbs val="100"/>
+                                  </p:iterate>
                                   <p:childTnLst>
                                     <p:set>
                                       <p:cBhvr>
-                                        <p:cTn id="14" dur="1" fill="hold">
+                                        <p:cTn id="13" dur="1" fill="hold">
                                           <p:stCondLst>
                                             <p:cond delay="0"/>
                                           </p:stCondLst>
@@ -10337,18 +10072,6 @@
                                         <p:strVal val="visible"/>
                                       </p:to>
                                     </p:set>
-                                    <p:animEffect transition="in" filter="fade">
-                                      <p:cBhvr>
-                                        <p:cTn id="15" dur="500"/>
-                                        <p:tgtEl>
-                                          <p:spTgt spid="3">
-                                            <p:txEl>
-                                              <p:pRg st="2" end="2"/>
-                                            </p:txEl>
-                                          </p:spTgt>
-                                        </p:tgtEl>
-                                      </p:cBhvr>
-                                    </p:animEffect>
                                   </p:childTnLst>
                                 </p:cTn>
                               </p:par>
@@ -10359,26 +10082,29 @@
                     </p:cTn>
                   </p:par>
                   <p:par>
-                    <p:cTn id="16" fill="hold">
+                    <p:cTn id="14" fill="hold">
                       <p:stCondLst>
                         <p:cond delay="indefinite"/>
                       </p:stCondLst>
                       <p:childTnLst>
                         <p:par>
-                          <p:cTn id="17" fill="hold">
+                          <p:cTn id="15" fill="hold">
                             <p:stCondLst>
                               <p:cond delay="0"/>
                             </p:stCondLst>
                             <p:childTnLst>
                               <p:par>
-                                <p:cTn id="18" presetID="10" presetClass="entr" presetSubtype="0" fill="hold" nodeType="clickEffect">
+                                <p:cTn id="16" presetID="1" presetClass="entr" presetSubtype="0" fill="hold" nodeType="clickEffect">
                                   <p:stCondLst>
                                     <p:cond delay="0"/>
                                   </p:stCondLst>
+                                  <p:iterate type="lt">
+                                    <p:tmAbs val="100"/>
+                                  </p:iterate>
                                   <p:childTnLst>
                                     <p:set>
                                       <p:cBhvr>
-                                        <p:cTn id="19" dur="1" fill="hold">
+                                        <p:cTn id="17" dur="1" fill="hold">
                                           <p:stCondLst>
                                             <p:cond delay="0"/>
                                           </p:stCondLst>
@@ -10398,30 +10124,30 @@
                                         <p:strVal val="visible"/>
                                       </p:to>
                                     </p:set>
-                                    <p:animEffect transition="in" filter="fade">
-                                      <p:cBhvr>
-                                        <p:cTn id="20" dur="500"/>
-                                        <p:tgtEl>
-                                          <p:spTgt spid="3">
-                                            <p:txEl>
-                                              <p:pRg st="3" end="3"/>
-                                            </p:txEl>
-                                          </p:spTgt>
-                                        </p:tgtEl>
-                                      </p:cBhvr>
-                                    </p:animEffect>
                                   </p:childTnLst>
                                 </p:cTn>
                               </p:par>
+                            </p:childTnLst>
+                          </p:cTn>
+                        </p:par>
+                        <p:par>
+                          <p:cTn id="18" fill="hold">
+                            <p:stCondLst>
+                              <p:cond delay="601"/>
+                            </p:stCondLst>
+                            <p:childTnLst>
                               <p:par>
-                                <p:cTn id="21" presetID="10" presetClass="entr" presetSubtype="0" fill="hold" nodeType="withEffect">
+                                <p:cTn id="19" presetID="1" presetClass="entr" presetSubtype="0" fill="hold" nodeType="afterEffect">
                                   <p:stCondLst>
                                     <p:cond delay="0"/>
                                   </p:stCondLst>
+                                  <p:iterate type="lt">
+                                    <p:tmAbs val="100"/>
+                                  </p:iterate>
                                   <p:childTnLst>
                                     <p:set>
                                       <p:cBhvr>
-                                        <p:cTn id="22" dur="1" fill="hold">
+                                        <p:cTn id="20" dur="1" fill="hold">
                                           <p:stCondLst>
                                             <p:cond delay="0"/>
                                           </p:stCondLst>
@@ -10441,30 +10167,30 @@
                                         <p:strVal val="visible"/>
                                       </p:to>
                                     </p:set>
-                                    <p:animEffect transition="in" filter="fade">
-                                      <p:cBhvr>
-                                        <p:cTn id="23" dur="500"/>
-                                        <p:tgtEl>
-                                          <p:spTgt spid="3">
-                                            <p:txEl>
-                                              <p:pRg st="4" end="4"/>
-                                            </p:txEl>
-                                          </p:spTgt>
-                                        </p:tgtEl>
-                                      </p:cBhvr>
-                                    </p:animEffect>
                                   </p:childTnLst>
                                 </p:cTn>
                               </p:par>
+                            </p:childTnLst>
+                          </p:cTn>
+                        </p:par>
+                        <p:par>
+                          <p:cTn id="21" fill="hold">
+                            <p:stCondLst>
+                              <p:cond delay="1102"/>
+                            </p:stCondLst>
+                            <p:childTnLst>
                               <p:par>
-                                <p:cTn id="24" presetID="10" presetClass="entr" presetSubtype="0" fill="hold" nodeType="withEffect">
+                                <p:cTn id="22" presetID="1" presetClass="entr" presetSubtype="0" fill="hold" nodeType="afterEffect">
                                   <p:stCondLst>
                                     <p:cond delay="0"/>
                                   </p:stCondLst>
+                                  <p:iterate type="lt">
+                                    <p:tmAbs val="100"/>
+                                  </p:iterate>
                                   <p:childTnLst>
                                     <p:set>
                                       <p:cBhvr>
-                                        <p:cTn id="25" dur="1" fill="hold">
+                                        <p:cTn id="23" dur="1" fill="hold">
                                           <p:stCondLst>
                                             <p:cond delay="0"/>
                                           </p:stCondLst>
@@ -10484,18 +10210,6 @@
                                         <p:strVal val="visible"/>
                                       </p:to>
                                     </p:set>
-                                    <p:animEffect transition="in" filter="fade">
-                                      <p:cBhvr>
-                                        <p:cTn id="26" dur="500"/>
-                                        <p:tgtEl>
-                                          <p:spTgt spid="3">
-                                            <p:txEl>
-                                              <p:pRg st="5" end="5"/>
-                                            </p:txEl>
-                                          </p:spTgt>
-                                        </p:tgtEl>
-                                      </p:cBhvr>
-                                    </p:animEffect>
                                   </p:childTnLst>
                                 </p:cTn>
                               </p:par>
@@ -10506,26 +10220,29 @@
                     </p:cTn>
                   </p:par>
                   <p:par>
-                    <p:cTn id="27" fill="hold">
+                    <p:cTn id="24" fill="hold">
                       <p:stCondLst>
                         <p:cond delay="indefinite"/>
                       </p:stCondLst>
                       <p:childTnLst>
                         <p:par>
-                          <p:cTn id="28" fill="hold">
+                          <p:cTn id="25" fill="hold">
                             <p:stCondLst>
                               <p:cond delay="0"/>
                             </p:stCondLst>
                             <p:childTnLst>
                               <p:par>
-                                <p:cTn id="29" presetID="10" presetClass="entr" presetSubtype="0" fill="hold" nodeType="clickEffect">
+                                <p:cTn id="26" presetID="1" presetClass="entr" presetSubtype="0" fill="hold" nodeType="clickEffect">
                                   <p:stCondLst>
                                     <p:cond delay="0"/>
                                   </p:stCondLst>
+                                  <p:iterate type="lt">
+                                    <p:tmAbs val="100"/>
+                                  </p:iterate>
                                   <p:childTnLst>
                                     <p:set>
                                       <p:cBhvr>
-                                        <p:cTn id="30" dur="1" fill="hold">
+                                        <p:cTn id="27" dur="1" fill="hold">
                                           <p:stCondLst>
                                             <p:cond delay="0"/>
                                           </p:stCondLst>
@@ -10545,18 +10262,6 @@
                                         <p:strVal val="visible"/>
                                       </p:to>
                                     </p:set>
-                                    <p:animEffect transition="in" filter="fade">
-                                      <p:cBhvr>
-                                        <p:cTn id="31" dur="500"/>
-                                        <p:tgtEl>
-                                          <p:spTgt spid="3">
-                                            <p:txEl>
-                                              <p:pRg st="6" end="6"/>
-                                            </p:txEl>
-                                          </p:spTgt>
-                                        </p:tgtEl>
-                                      </p:cBhvr>
-                                    </p:animEffect>
                                   </p:childTnLst>
                                 </p:cTn>
                               </p:par>
@@ -10567,26 +10272,26 @@
                     </p:cTn>
                   </p:par>
                   <p:par>
-                    <p:cTn id="32" fill="hold">
+                    <p:cTn id="28" fill="hold">
                       <p:stCondLst>
                         <p:cond delay="indefinite"/>
                       </p:stCondLst>
                       <p:childTnLst>
                         <p:par>
-                          <p:cTn id="33" fill="hold">
+                          <p:cTn id="29" fill="hold">
                             <p:stCondLst>
                               <p:cond delay="0"/>
                             </p:stCondLst>
                             <p:childTnLst>
                               <p:par>
-                                <p:cTn id="34" presetID="10" presetClass="entr" presetSubtype="0" fill="hold" nodeType="clickEffect">
+                                <p:cTn id="30" presetID="10" presetClass="entr" presetSubtype="0" fill="hold" nodeType="clickEffect">
                                   <p:stCondLst>
                                     <p:cond delay="0"/>
                                   </p:stCondLst>
                                   <p:childTnLst>
                                     <p:set>
                                       <p:cBhvr>
-                                        <p:cTn id="35" dur="1" fill="hold">
+                                        <p:cTn id="31" dur="1" fill="hold">
                                           <p:stCondLst>
                                             <p:cond delay="0"/>
                                           </p:stCondLst>
@@ -10608,7 +10313,7 @@
                                     </p:set>
                                     <p:animEffect transition="in" filter="fade">
                                       <p:cBhvr>
-                                        <p:cTn id="36" dur="500"/>
+                                        <p:cTn id="32" dur="500"/>
                                         <p:tgtEl>
                                           <p:spTgt spid="4">
                                             <p:txEl>
@@ -10622,14 +10327,14 @@
                                 </p:cTn>
                               </p:par>
                               <p:par>
-                                <p:cTn id="37" presetID="10" presetClass="entr" presetSubtype="0" fill="hold" nodeType="withEffect">
+                                <p:cTn id="33" presetID="10" presetClass="entr" presetSubtype="0" fill="hold" nodeType="withEffect">
                                   <p:stCondLst>
                                     <p:cond delay="0"/>
                                   </p:stCondLst>
                                   <p:childTnLst>
                                     <p:set>
                                       <p:cBhvr>
-                                        <p:cTn id="38" dur="1" fill="hold">
+                                        <p:cTn id="34" dur="1" fill="hold">
                                           <p:stCondLst>
                                             <p:cond delay="0"/>
                                           </p:stCondLst>
@@ -10651,7 +10356,7 @@
                                     </p:set>
                                     <p:animEffect transition="in" filter="fade">
                                       <p:cBhvr>
-                                        <p:cTn id="39" dur="500"/>
+                                        <p:cTn id="35" dur="500"/>
                                         <p:tgtEl>
                                           <p:spTgt spid="4">
                                             <p:txEl>
@@ -10665,14 +10370,14 @@
                                 </p:cTn>
                               </p:par>
                               <p:par>
-                                <p:cTn id="40" presetID="10" presetClass="entr" presetSubtype="0" fill="hold" nodeType="withEffect">
+                                <p:cTn id="36" presetID="10" presetClass="entr" presetSubtype="0" fill="hold" nodeType="withEffect">
                                   <p:stCondLst>
                                     <p:cond delay="0"/>
                                   </p:stCondLst>
                                   <p:childTnLst>
                                     <p:set>
                                       <p:cBhvr>
-                                        <p:cTn id="41" dur="1" fill="hold">
+                                        <p:cTn id="37" dur="1" fill="hold">
                                           <p:stCondLst>
                                             <p:cond delay="0"/>
                                           </p:stCondLst>
@@ -10694,7 +10399,7 @@
                                     </p:set>
                                     <p:animEffect transition="in" filter="fade">
                                       <p:cBhvr>
-                                        <p:cTn id="42" dur="500"/>
+                                        <p:cTn id="38" dur="500"/>
                                         <p:tgtEl>
                                           <p:spTgt spid="4">
                                             <p:txEl>
@@ -11250,9 +10955,6 @@
               </a:rPr>
               <a:t>G</a:t>
             </a:r>
-            <a:endParaRPr lang="fr-FR" sz="7200" dirty="0">
-              <a:latin typeface="Calibri" panose="020F0502020204030204" pitchFamily="34" charset="0"/>
-            </a:endParaRPr>
           </a:p>
         </p:txBody>
       </p:sp>
@@ -11505,7 +11207,7 @@
                 <a:cs typeface="Courier New" panose="02070309020205020404" pitchFamily="49" charset="0"/>
                 <a:sym typeface="Wingdings" panose="05000000000000000000" pitchFamily="2" charset="2"/>
               </a:rPr>
-              <a:t>class A:</a:t>
+              <a:t>class C:</a:t>
             </a:r>
           </a:p>
           <a:p>
@@ -11531,20 +11233,23 @@
                 <a:cs typeface="Courier New" panose="02070309020205020404" pitchFamily="49" charset="0"/>
                 <a:sym typeface="Wingdings" panose="05000000000000000000" pitchFamily="2" charset="2"/>
               </a:rPr>
-              <a:t>    class B:</a:t>
-            </a:r>
-          </a:p>
-          <a:p>
-            <a:pPr marL="0" indent="0">
-              <a:buNone/>
-            </a:pPr>
+              <a:t>    </a:t>
+            </a:r>
+            <a:r>
+              <a:rPr lang="en-US" sz="2400" dirty="0" err="1">
+                <a:latin typeface="Courier New" panose="02070309020205020404" pitchFamily="49" charset="0"/>
+                <a:cs typeface="Courier New" panose="02070309020205020404" pitchFamily="49" charset="0"/>
+                <a:sym typeface="Wingdings" panose="05000000000000000000" pitchFamily="2" charset="2"/>
+              </a:rPr>
+              <a:t>def</a:t>
+            </a:r>
             <a:r>
               <a:rPr lang="en-US" sz="2400" dirty="0">
                 <a:latin typeface="Courier New" panose="02070309020205020404" pitchFamily="49" charset="0"/>
                 <a:cs typeface="Courier New" panose="02070309020205020404" pitchFamily="49" charset="0"/>
                 <a:sym typeface="Wingdings" panose="05000000000000000000" pitchFamily="2" charset="2"/>
               </a:rPr>
-              <a:t>        print a</a:t>
+              <a:t> f(self):</a:t>
             </a:r>
           </a:p>
           <a:p>
@@ -11557,7 +11262,7 @@
                 <a:cs typeface="Courier New" panose="02070309020205020404" pitchFamily="49" charset="0"/>
                 <a:sym typeface="Wingdings" panose="05000000000000000000" pitchFamily="2" charset="2"/>
               </a:rPr>
-              <a:t>    B()</a:t>
+              <a:t>        print a</a:t>
             </a:r>
           </a:p>
           <a:p>
@@ -11570,7 +11275,33 @@
                 <a:cs typeface="Courier New" panose="02070309020205020404" pitchFamily="49" charset="0"/>
                 <a:sym typeface="Wingdings" panose="05000000000000000000" pitchFamily="2" charset="2"/>
               </a:rPr>
-              <a:t>A()</a:t>
+              <a:t>        print </a:t>
+            </a:r>
+            <a:r>
+              <a:rPr lang="en-US" sz="2400" dirty="0" err="1">
+                <a:latin typeface="Courier New" panose="02070309020205020404" pitchFamily="49" charset="0"/>
+                <a:cs typeface="Courier New" panose="02070309020205020404" pitchFamily="49" charset="0"/>
+                <a:sym typeface="Wingdings" panose="05000000000000000000" pitchFamily="2" charset="2"/>
+              </a:rPr>
+              <a:t>C.a</a:t>
+            </a:r>
+            <a:endParaRPr lang="en-US" sz="2400" dirty="0">
+              <a:latin typeface="Courier New" panose="02070309020205020404" pitchFamily="49" charset="0"/>
+              <a:cs typeface="Courier New" panose="02070309020205020404" pitchFamily="49" charset="0"/>
+              <a:sym typeface="Wingdings" panose="05000000000000000000" pitchFamily="2" charset="2"/>
+            </a:endParaRPr>
+          </a:p>
+          <a:p>
+            <a:pPr marL="0" indent="0">
+              <a:buNone/>
+            </a:pPr>
+            <a:r>
+              <a:rPr lang="en-US" sz="2400" dirty="0">
+                <a:latin typeface="Courier New" panose="02070309020205020404" pitchFamily="49" charset="0"/>
+                <a:cs typeface="Courier New" panose="02070309020205020404" pitchFamily="49" charset="0"/>
+                <a:sym typeface="Wingdings" panose="05000000000000000000" pitchFamily="2" charset="2"/>
+              </a:rPr>
+              <a:t>C().f()</a:t>
             </a:r>
           </a:p>
         </p:txBody>
@@ -11784,12 +11515,25 @@
               <a:buNone/>
             </a:pPr>
             <a:r>
+              <a:rPr lang="fr-FR" sz="2400" kern="0" dirty="0" smtClean="0">
+                <a:latin typeface="Courier New" panose="02070309020205020404" pitchFamily="49" charset="0"/>
+                <a:cs typeface="Courier New" panose="02070309020205020404" pitchFamily="49" charset="0"/>
+                <a:sym typeface="Wingdings" panose="05000000000000000000" pitchFamily="2" charset="2"/>
+              </a:rPr>
+              <a:t>1</a:t>
+            </a:r>
+          </a:p>
+          <a:p>
+            <a:pPr marL="0" indent="0">
+              <a:buNone/>
+            </a:pPr>
+            <a:r>
               <a:rPr lang="fr-FR" sz="2400" kern="0" dirty="0">
                 <a:latin typeface="Courier New" panose="02070309020205020404" pitchFamily="49" charset="0"/>
                 <a:cs typeface="Courier New" panose="02070309020205020404" pitchFamily="49" charset="0"/>
                 <a:sym typeface="Wingdings" panose="05000000000000000000" pitchFamily="2" charset="2"/>
               </a:rPr>
-              <a:t>1</a:t>
+              <a:t>2</a:t>
             </a:r>
           </a:p>
           <a:p>
@@ -11898,10 +11642,25 @@
           <a:lstStyle/>
           <a:p>
             <a:r>
-              <a:rPr lang="fr-FR" sz="7200" dirty="0" smtClean="0">
+              <a:rPr lang="fr-FR" sz="7200" dirty="0">
                 <a:latin typeface="Calibri" panose="020F0502020204030204" pitchFamily="34" charset="0"/>
               </a:rPr>
-              <a:t>Classes : règle LG</a:t>
+              <a:t>Fonctions : règle L</a:t>
+            </a:r>
+            <a:r>
+              <a:rPr lang="fr-FR" sz="7200" dirty="0">
+                <a:solidFill>
+                  <a:srgbClr val="FF0000"/>
+                </a:solidFill>
+                <a:latin typeface="Calibri" panose="020F0502020204030204" pitchFamily="34" charset="0"/>
+              </a:rPr>
+              <a:t>E</a:t>
+            </a:r>
+            <a:r>
+              <a:rPr lang="fr-FR" sz="7200" dirty="0">
+                <a:latin typeface="Calibri" panose="020F0502020204030204" pitchFamily="34" charset="0"/>
+              </a:rPr>
+              <a:t>G</a:t>
             </a:r>
             <a:endParaRPr lang="fr-FR" sz="7200" dirty="0">
               <a:latin typeface="Calibri" panose="020F0502020204030204" pitchFamily="34" charset="0"/>
@@ -11912,7 +11671,7 @@
     </p:spTree>
     <p:extLst>
       <p:ext uri="{BB962C8B-B14F-4D97-AF65-F5344CB8AC3E}">
-        <p14:creationId xmlns:p14="http://schemas.microsoft.com/office/powerpoint/2010/main" val="3382327983"/>
+        <p14:creationId xmlns:p14="http://schemas.microsoft.com/office/powerpoint/2010/main" val="2185123115"/>
       </p:ext>
     </p:extLst>
   </p:cSld>
@@ -11940,10 +11699,13 @@
                             </p:stCondLst>
                             <p:childTnLst>
                               <p:par>
-                                <p:cTn id="5" presetID="10" presetClass="entr" presetSubtype="0" fill="hold" nodeType="clickEffect">
+                                <p:cTn id="5" presetID="1" presetClass="entr" presetSubtype="0" fill="hold" nodeType="clickEffect">
                                   <p:stCondLst>
                                     <p:cond delay="0"/>
                                   </p:stCondLst>
+                                  <p:iterate type="lt">
+                                    <p:tmAbs val="100"/>
+                                  </p:iterate>
                                   <p:childTnLst>
                                     <p:set>
                                       <p:cBhvr>
@@ -11967,18 +11729,6 @@
                                         <p:strVal val="visible"/>
                                       </p:to>
                                     </p:set>
-                                    <p:animEffect transition="in" filter="fade">
-                                      <p:cBhvr>
-                                        <p:cTn id="7" dur="500"/>
-                                        <p:tgtEl>
-                                          <p:spTgt spid="3">
-                                            <p:txEl>
-                                              <p:pRg st="0" end="0"/>
-                                            </p:txEl>
-                                          </p:spTgt>
-                                        </p:tgtEl>
-                                      </p:cBhvr>
-                                    </p:animEffect>
                                   </p:childTnLst>
                                 </p:cTn>
                               </p:par>
@@ -11989,26 +11739,29 @@
                     </p:cTn>
                   </p:par>
                   <p:par>
-                    <p:cTn id="8" fill="hold">
+                    <p:cTn id="7" fill="hold">
                       <p:stCondLst>
                         <p:cond delay="indefinite"/>
                       </p:stCondLst>
                       <p:childTnLst>
                         <p:par>
-                          <p:cTn id="9" fill="hold">
+                          <p:cTn id="8" fill="hold">
                             <p:stCondLst>
                               <p:cond delay="0"/>
                             </p:stCondLst>
                             <p:childTnLst>
                               <p:par>
-                                <p:cTn id="10" presetID="10" presetClass="entr" presetSubtype="0" fill="hold" nodeType="clickEffect">
+                                <p:cTn id="9" presetID="1" presetClass="entr" presetSubtype="0" fill="hold" nodeType="clickEffect">
                                   <p:stCondLst>
                                     <p:cond delay="0"/>
                                   </p:stCondLst>
+                                  <p:iterate type="lt">
+                                    <p:tmAbs val="100"/>
+                                  </p:iterate>
                                   <p:childTnLst>
                                     <p:set>
                                       <p:cBhvr>
-                                        <p:cTn id="11" dur="1" fill="hold">
+                                        <p:cTn id="10" dur="1" fill="hold">
                                           <p:stCondLst>
                                             <p:cond delay="0"/>
                                           </p:stCondLst>
@@ -12028,30 +11781,30 @@
                                         <p:strVal val="visible"/>
                                       </p:to>
                                     </p:set>
-                                    <p:animEffect transition="in" filter="fade">
-                                      <p:cBhvr>
-                                        <p:cTn id="12" dur="500"/>
-                                        <p:tgtEl>
-                                          <p:spTgt spid="3">
-                                            <p:txEl>
-                                              <p:pRg st="1" end="1"/>
-                                            </p:txEl>
-                                          </p:spTgt>
-                                        </p:tgtEl>
-                                      </p:cBhvr>
-                                    </p:animEffect>
                                   </p:childTnLst>
                                 </p:cTn>
                               </p:par>
+                            </p:childTnLst>
+                          </p:cTn>
+                        </p:par>
+                        <p:par>
+                          <p:cTn id="11" fill="hold">
+                            <p:stCondLst>
+                              <p:cond delay="601"/>
+                            </p:stCondLst>
+                            <p:childTnLst>
                               <p:par>
-                                <p:cTn id="13" presetID="10" presetClass="entr" presetSubtype="0" fill="hold" nodeType="withEffect">
+                                <p:cTn id="12" presetID="1" presetClass="entr" presetSubtype="0" fill="hold" nodeType="afterEffect">
                                   <p:stCondLst>
                                     <p:cond delay="0"/>
                                   </p:stCondLst>
+                                  <p:iterate type="lt">
+                                    <p:tmAbs val="100"/>
+                                  </p:iterate>
                                   <p:childTnLst>
                                     <p:set>
                                       <p:cBhvr>
-                                        <p:cTn id="14" dur="1" fill="hold">
+                                        <p:cTn id="13" dur="1" fill="hold">
                                           <p:stCondLst>
                                             <p:cond delay="0"/>
                                           </p:stCondLst>
@@ -12071,18 +11824,6 @@
                                         <p:strVal val="visible"/>
                                       </p:to>
                                     </p:set>
-                                    <p:animEffect transition="in" filter="fade">
-                                      <p:cBhvr>
-                                        <p:cTn id="15" dur="500"/>
-                                        <p:tgtEl>
-                                          <p:spTgt spid="3">
-                                            <p:txEl>
-                                              <p:pRg st="2" end="2"/>
-                                            </p:txEl>
-                                          </p:spTgt>
-                                        </p:tgtEl>
-                                      </p:cBhvr>
-                                    </p:animEffect>
                                   </p:childTnLst>
                                 </p:cTn>
                               </p:par>
@@ -12093,26 +11834,29 @@
                     </p:cTn>
                   </p:par>
                   <p:par>
-                    <p:cTn id="16" fill="hold">
+                    <p:cTn id="14" fill="hold">
                       <p:stCondLst>
                         <p:cond delay="indefinite"/>
                       </p:stCondLst>
                       <p:childTnLst>
                         <p:par>
-                          <p:cTn id="17" fill="hold">
+                          <p:cTn id="15" fill="hold">
                             <p:stCondLst>
                               <p:cond delay="0"/>
                             </p:stCondLst>
                             <p:childTnLst>
                               <p:par>
-                                <p:cTn id="18" presetID="10" presetClass="entr" presetSubtype="0" fill="hold" nodeType="clickEffect">
+                                <p:cTn id="16" presetID="1" presetClass="entr" presetSubtype="0" fill="hold" nodeType="clickEffect">
                                   <p:stCondLst>
                                     <p:cond delay="0"/>
                                   </p:stCondLst>
+                                  <p:iterate type="lt">
+                                    <p:tmAbs val="100"/>
+                                  </p:iterate>
                                   <p:childTnLst>
                                     <p:set>
                                       <p:cBhvr>
-                                        <p:cTn id="19" dur="1" fill="hold">
+                                        <p:cTn id="17" dur="1" fill="hold">
                                           <p:stCondLst>
                                             <p:cond delay="0"/>
                                           </p:stCondLst>
@@ -12132,30 +11876,30 @@
                                         <p:strVal val="visible"/>
                                       </p:to>
                                     </p:set>
-                                    <p:animEffect transition="in" filter="fade">
-                                      <p:cBhvr>
-                                        <p:cTn id="20" dur="500"/>
-                                        <p:tgtEl>
-                                          <p:spTgt spid="3">
-                                            <p:txEl>
-                                              <p:pRg st="3" end="3"/>
-                                            </p:txEl>
-                                          </p:spTgt>
-                                        </p:tgtEl>
-                                      </p:cBhvr>
-                                    </p:animEffect>
                                   </p:childTnLst>
                                 </p:cTn>
                               </p:par>
+                            </p:childTnLst>
+                          </p:cTn>
+                        </p:par>
+                        <p:par>
+                          <p:cTn id="18" fill="hold">
+                            <p:stCondLst>
+                              <p:cond delay="1001"/>
+                            </p:stCondLst>
+                            <p:childTnLst>
                               <p:par>
-                                <p:cTn id="21" presetID="10" presetClass="entr" presetSubtype="0" fill="hold" nodeType="withEffect">
+                                <p:cTn id="19" presetID="1" presetClass="entr" presetSubtype="0" fill="hold" nodeType="afterEffect">
                                   <p:stCondLst>
                                     <p:cond delay="0"/>
                                   </p:stCondLst>
+                                  <p:iterate type="lt">
+                                    <p:tmAbs val="100"/>
+                                  </p:iterate>
                                   <p:childTnLst>
                                     <p:set>
                                       <p:cBhvr>
-                                        <p:cTn id="22" dur="1" fill="hold">
+                                        <p:cTn id="20" dur="1" fill="hold">
                                           <p:stCondLst>
                                             <p:cond delay="0"/>
                                           </p:stCondLst>
@@ -12175,18 +11919,49 @@
                                         <p:strVal val="visible"/>
                                       </p:to>
                                     </p:set>
-                                    <p:animEffect transition="in" filter="fade">
+                                  </p:childTnLst>
+                                </p:cTn>
+                              </p:par>
+                            </p:childTnLst>
+                          </p:cTn>
+                        </p:par>
+                        <p:par>
+                          <p:cTn id="21" fill="hold">
+                            <p:stCondLst>
+                              <p:cond delay="1502"/>
+                            </p:stCondLst>
+                            <p:childTnLst>
+                              <p:par>
+                                <p:cTn id="22" presetID="1" presetClass="entr" presetSubtype="0" fill="hold" nodeType="afterEffect">
+                                  <p:stCondLst>
+                                    <p:cond delay="0"/>
+                                  </p:stCondLst>
+                                  <p:iterate type="lt">
+                                    <p:tmAbs val="100"/>
+                                  </p:iterate>
+                                  <p:childTnLst>
+                                    <p:set>
                                       <p:cBhvr>
-                                        <p:cTn id="23" dur="500"/>
+                                        <p:cTn id="23" dur="1" fill="hold">
+                                          <p:stCondLst>
+                                            <p:cond delay="0"/>
+                                          </p:stCondLst>
+                                        </p:cTn>
                                         <p:tgtEl>
                                           <p:spTgt spid="3">
                                             <p:txEl>
-                                              <p:pRg st="4" end="4"/>
+                                              <p:pRg st="5" end="5"/>
                                             </p:txEl>
                                           </p:spTgt>
                                         </p:tgtEl>
+                                        <p:attrNameLst>
+                                          <p:attrName>style.visibility</p:attrName>
+                                        </p:attrNameLst>
                                       </p:cBhvr>
-                                    </p:animEffect>
+                                      <p:to>
+                                        <p:strVal val="visible"/>
+                                      </p:to>
+                                    </p:set>
                                   </p:childTnLst>
                                 </p:cTn>
                               </p:par>
@@ -12209,75 +11984,17 @@
                             </p:stCondLst>
                             <p:childTnLst>
                               <p:par>
-                                <p:cTn id="26" presetID="10" presetClass="entr" presetSubtype="0" fill="hold" nodeType="clickEffect">
+                                <p:cTn id="26" presetID="1" presetClass="entr" presetSubtype="0" fill="hold" nodeType="clickEffect">
                                   <p:stCondLst>
                                     <p:cond delay="0"/>
                                   </p:stCondLst>
+                                  <p:iterate type="lt">
+                                    <p:tmAbs val="100"/>
+                                  </p:iterate>
                                   <p:childTnLst>
                                     <p:set>
                                       <p:cBhvr>
                                         <p:cTn id="27" dur="1" fill="hold">
-                                          <p:stCondLst>
-                                            <p:cond delay="0"/>
-                                          </p:stCondLst>
-                                        </p:cTn>
-                                        <p:tgtEl>
-                                          <p:spTgt spid="3">
-                                            <p:txEl>
-                                              <p:pRg st="5" end="5"/>
-                                            </p:txEl>
-                                          </p:spTgt>
-                                        </p:tgtEl>
-                                        <p:attrNameLst>
-                                          <p:attrName>style.visibility</p:attrName>
-                                        </p:attrNameLst>
-                                      </p:cBhvr>
-                                      <p:to>
-                                        <p:strVal val="visible"/>
-                                      </p:to>
-                                    </p:set>
-                                    <p:animEffect transition="in" filter="fade">
-                                      <p:cBhvr>
-                                        <p:cTn id="28" dur="500"/>
-                                        <p:tgtEl>
-                                          <p:spTgt spid="3">
-                                            <p:txEl>
-                                              <p:pRg st="5" end="5"/>
-                                            </p:txEl>
-                                          </p:spTgt>
-                                        </p:tgtEl>
-                                      </p:cBhvr>
-                                    </p:animEffect>
-                                  </p:childTnLst>
-                                </p:cTn>
-                              </p:par>
-                            </p:childTnLst>
-                          </p:cTn>
-                        </p:par>
-                      </p:childTnLst>
-                    </p:cTn>
-                  </p:par>
-                  <p:par>
-                    <p:cTn id="29" fill="hold">
-                      <p:stCondLst>
-                        <p:cond delay="indefinite"/>
-                      </p:stCondLst>
-                      <p:childTnLst>
-                        <p:par>
-                          <p:cTn id="30" fill="hold">
-                            <p:stCondLst>
-                              <p:cond delay="0"/>
-                            </p:stCondLst>
-                            <p:childTnLst>
-                              <p:par>
-                                <p:cTn id="31" presetID="10" presetClass="entr" presetSubtype="0" fill="hold" nodeType="clickEffect">
-                                  <p:stCondLst>
-                                    <p:cond delay="0"/>
-                                  </p:stCondLst>
-                                  <p:childTnLst>
-                                    <p:set>
-                                      <p:cBhvr>
-                                        <p:cTn id="32" dur="1" fill="hold">
                                           <p:stCondLst>
                                             <p:cond delay="0"/>
                                           </p:stCondLst>
@@ -12297,18 +12014,6 @@
                                         <p:strVal val="visible"/>
                                       </p:to>
                                     </p:set>
-                                    <p:animEffect transition="in" filter="fade">
-                                      <p:cBhvr>
-                                        <p:cTn id="33" dur="500"/>
-                                        <p:tgtEl>
-                                          <p:spTgt spid="3">
-                                            <p:txEl>
-                                              <p:pRg st="6" end="6"/>
-                                            </p:txEl>
-                                          </p:spTgt>
-                                        </p:tgtEl>
-                                      </p:cBhvr>
-                                    </p:animEffect>
                                   </p:childTnLst>
                                 </p:cTn>
                               </p:par>
@@ -12319,26 +12024,26 @@
                     </p:cTn>
                   </p:par>
                   <p:par>
-                    <p:cTn id="34" fill="hold">
+                    <p:cTn id="28" fill="hold">
                       <p:stCondLst>
                         <p:cond delay="indefinite"/>
                       </p:stCondLst>
                       <p:childTnLst>
                         <p:par>
-                          <p:cTn id="35" fill="hold">
+                          <p:cTn id="29" fill="hold">
                             <p:stCondLst>
                               <p:cond delay="0"/>
                             </p:stCondLst>
                             <p:childTnLst>
                               <p:par>
-                                <p:cTn id="36" presetID="10" presetClass="entr" presetSubtype="0" fill="hold" nodeType="clickEffect">
+                                <p:cTn id="30" presetID="10" presetClass="entr" presetSubtype="0" fill="hold" nodeType="clickEffect">
                                   <p:stCondLst>
                                     <p:cond delay="0"/>
                                   </p:stCondLst>
                                   <p:childTnLst>
                                     <p:set>
                                       <p:cBhvr>
-                                        <p:cTn id="37" dur="1" fill="hold">
+                                        <p:cTn id="31" dur="1" fill="hold">
                                           <p:stCondLst>
                                             <p:cond delay="0"/>
                                           </p:stCondLst>
@@ -12360,11 +12065,97 @@
                                     </p:set>
                                     <p:animEffect transition="in" filter="fade">
                                       <p:cBhvr>
+                                        <p:cTn id="32" dur="500"/>
+                                        <p:tgtEl>
+                                          <p:spTgt spid="4">
+                                            <p:txEl>
+                                              <p:pRg st="0" end="0"/>
+                                            </p:txEl>
+                                          </p:spTgt>
+                                        </p:tgtEl>
+                                      </p:cBhvr>
+                                    </p:animEffect>
+                                  </p:childTnLst>
+                                </p:cTn>
+                              </p:par>
+                              <p:par>
+                                <p:cTn id="33" presetID="10" presetClass="entr" presetSubtype="0" fill="hold" nodeType="withEffect">
+                                  <p:stCondLst>
+                                    <p:cond delay="0"/>
+                                  </p:stCondLst>
+                                  <p:childTnLst>
+                                    <p:set>
+                                      <p:cBhvr>
+                                        <p:cTn id="34" dur="1" fill="hold">
+                                          <p:stCondLst>
+                                            <p:cond delay="0"/>
+                                          </p:stCondLst>
+                                        </p:cTn>
+                                        <p:tgtEl>
+                                          <p:spTgt spid="4">
+                                            <p:txEl>
+                                              <p:pRg st="1" end="1"/>
+                                            </p:txEl>
+                                          </p:spTgt>
+                                        </p:tgtEl>
+                                        <p:attrNameLst>
+                                          <p:attrName>style.visibility</p:attrName>
+                                        </p:attrNameLst>
+                                      </p:cBhvr>
+                                      <p:to>
+                                        <p:strVal val="visible"/>
+                                      </p:to>
+                                    </p:set>
+                                    <p:animEffect transition="in" filter="fade">
+                                      <p:cBhvr>
+                                        <p:cTn id="35" dur="500"/>
+                                        <p:tgtEl>
+                                          <p:spTgt spid="4">
+                                            <p:txEl>
+                                              <p:pRg st="1" end="1"/>
+                                            </p:txEl>
+                                          </p:spTgt>
+                                        </p:tgtEl>
+                                      </p:cBhvr>
+                                    </p:animEffect>
+                                  </p:childTnLst>
+                                </p:cTn>
+                              </p:par>
+                              <p:par>
+                                <p:cTn id="36" presetID="10" presetClass="entr" presetSubtype="0" fill="hold" nodeType="withEffect">
+                                  <p:stCondLst>
+                                    <p:cond delay="0"/>
+                                  </p:stCondLst>
+                                  <p:childTnLst>
+                                    <p:set>
+                                      <p:cBhvr>
+                                        <p:cTn id="37" dur="1" fill="hold">
+                                          <p:stCondLst>
+                                            <p:cond delay="0"/>
+                                          </p:stCondLst>
+                                        </p:cTn>
+                                        <p:tgtEl>
+                                          <p:spTgt spid="4">
+                                            <p:txEl>
+                                              <p:pRg st="2" end="2"/>
+                                            </p:txEl>
+                                          </p:spTgt>
+                                        </p:tgtEl>
+                                        <p:attrNameLst>
+                                          <p:attrName>style.visibility</p:attrName>
+                                        </p:attrNameLst>
+                                      </p:cBhvr>
+                                      <p:to>
+                                        <p:strVal val="visible"/>
+                                      </p:to>
+                                    </p:set>
+                                    <p:animEffect transition="in" filter="fade">
+                                      <p:cBhvr>
                                         <p:cTn id="38" dur="500"/>
                                         <p:tgtEl>
                                           <p:spTgt spid="4">
                                             <p:txEl>
-                                              <p:pRg st="0" end="0"/>
+                                              <p:pRg st="2" end="2"/>
                                             </p:txEl>
                                           </p:spTgt>
                                         </p:tgtEl>
@@ -12389,7 +12180,7 @@
                                         <p:tgtEl>
                                           <p:spTgt spid="4">
                                             <p:txEl>
-                                              <p:pRg st="1" end="1"/>
+                                              <p:pRg st="3" end="3"/>
                                             </p:txEl>
                                           </p:spTgt>
                                         </p:tgtEl>
@@ -12407,50 +12198,7 @@
                                         <p:tgtEl>
                                           <p:spTgt spid="4">
                                             <p:txEl>
-                                              <p:pRg st="1" end="1"/>
-                                            </p:txEl>
-                                          </p:spTgt>
-                                        </p:tgtEl>
-                                      </p:cBhvr>
-                                    </p:animEffect>
-                                  </p:childTnLst>
-                                </p:cTn>
-                              </p:par>
-                              <p:par>
-                                <p:cTn id="42" presetID="10" presetClass="entr" presetSubtype="0" fill="hold" nodeType="withEffect">
-                                  <p:stCondLst>
-                                    <p:cond delay="0"/>
-                                  </p:stCondLst>
-                                  <p:childTnLst>
-                                    <p:set>
-                                      <p:cBhvr>
-                                        <p:cTn id="43" dur="1" fill="hold">
-                                          <p:stCondLst>
-                                            <p:cond delay="0"/>
-                                          </p:stCondLst>
-                                        </p:cTn>
-                                        <p:tgtEl>
-                                          <p:spTgt spid="4">
-                                            <p:txEl>
-                                              <p:pRg st="2" end="2"/>
-                                            </p:txEl>
-                                          </p:spTgt>
-                                        </p:tgtEl>
-                                        <p:attrNameLst>
-                                          <p:attrName>style.visibility</p:attrName>
-                                        </p:attrNameLst>
-                                      </p:cBhvr>
-                                      <p:to>
-                                        <p:strVal val="visible"/>
-                                      </p:to>
-                                    </p:set>
-                                    <p:animEffect transition="in" filter="fade">
-                                      <p:cBhvr>
-                                        <p:cTn id="44" dur="500"/>
-                                        <p:tgtEl>
-                                          <p:spTgt spid="4">
-                                            <p:txEl>
-                                              <p:pRg st="2" end="2"/>
+                                              <p:pRg st="3" end="3"/>
                                             </p:txEl>
                                           </p:spTgt>
                                         </p:tgtEl>
@@ -12549,7 +12297,7 @@
                 <a:cs typeface="Courier New" panose="02070309020205020404" pitchFamily="49" charset="0"/>
                 <a:sym typeface="Wingdings" panose="05000000000000000000" pitchFamily="2" charset="2"/>
               </a:rPr>
-              <a:t>class C:</a:t>
+              <a:t>class A:</a:t>
             </a:r>
           </a:p>
           <a:p>
@@ -12575,23 +12323,20 @@
                 <a:cs typeface="Courier New" panose="02070309020205020404" pitchFamily="49" charset="0"/>
                 <a:sym typeface="Wingdings" panose="05000000000000000000" pitchFamily="2" charset="2"/>
               </a:rPr>
-              <a:t>    </a:t>
-            </a:r>
-            <a:r>
-              <a:rPr lang="en-US" sz="2400" dirty="0" err="1">
-                <a:latin typeface="Courier New" panose="02070309020205020404" pitchFamily="49" charset="0"/>
-                <a:cs typeface="Courier New" panose="02070309020205020404" pitchFamily="49" charset="0"/>
-                <a:sym typeface="Wingdings" panose="05000000000000000000" pitchFamily="2" charset="2"/>
-              </a:rPr>
-              <a:t>def</a:t>
-            </a:r>
+              <a:t>    class B:</a:t>
+            </a:r>
+          </a:p>
+          <a:p>
+            <a:pPr marL="0" indent="0">
+              <a:buNone/>
+            </a:pPr>
             <a:r>
               <a:rPr lang="en-US" sz="2400" dirty="0">
                 <a:latin typeface="Courier New" panose="02070309020205020404" pitchFamily="49" charset="0"/>
                 <a:cs typeface="Courier New" panose="02070309020205020404" pitchFamily="49" charset="0"/>
                 <a:sym typeface="Wingdings" panose="05000000000000000000" pitchFamily="2" charset="2"/>
               </a:rPr>
-              <a:t> f(self):</a:t>
+              <a:t>        print a</a:t>
             </a:r>
           </a:p>
           <a:p>
@@ -12604,7 +12349,7 @@
                 <a:cs typeface="Courier New" panose="02070309020205020404" pitchFamily="49" charset="0"/>
                 <a:sym typeface="Wingdings" panose="05000000000000000000" pitchFamily="2" charset="2"/>
               </a:rPr>
-              <a:t>        print a</a:t>
+              <a:t>    B()</a:t>
             </a:r>
           </a:p>
           <a:p>
@@ -12617,33 +12362,7 @@
                 <a:cs typeface="Courier New" panose="02070309020205020404" pitchFamily="49" charset="0"/>
                 <a:sym typeface="Wingdings" panose="05000000000000000000" pitchFamily="2" charset="2"/>
               </a:rPr>
-              <a:t>        print </a:t>
-            </a:r>
-            <a:r>
-              <a:rPr lang="en-US" sz="2400" dirty="0" err="1">
-                <a:latin typeface="Courier New" panose="02070309020205020404" pitchFamily="49" charset="0"/>
-                <a:cs typeface="Courier New" panose="02070309020205020404" pitchFamily="49" charset="0"/>
-                <a:sym typeface="Wingdings" panose="05000000000000000000" pitchFamily="2" charset="2"/>
-              </a:rPr>
-              <a:t>C.a</a:t>
-            </a:r>
-            <a:endParaRPr lang="en-US" sz="2400" dirty="0">
-              <a:latin typeface="Courier New" panose="02070309020205020404" pitchFamily="49" charset="0"/>
-              <a:cs typeface="Courier New" panose="02070309020205020404" pitchFamily="49" charset="0"/>
-              <a:sym typeface="Wingdings" panose="05000000000000000000" pitchFamily="2" charset="2"/>
-            </a:endParaRPr>
-          </a:p>
-          <a:p>
-            <a:pPr marL="0" indent="0">
-              <a:buNone/>
-            </a:pPr>
-            <a:r>
-              <a:rPr lang="en-US" sz="2400" dirty="0">
-                <a:latin typeface="Courier New" panose="02070309020205020404" pitchFamily="49" charset="0"/>
-                <a:cs typeface="Courier New" panose="02070309020205020404" pitchFamily="49" charset="0"/>
-                <a:sym typeface="Wingdings" panose="05000000000000000000" pitchFamily="2" charset="2"/>
-              </a:rPr>
-              <a:t>C().f()</a:t>
+              <a:t>A()</a:t>
             </a:r>
           </a:p>
         </p:txBody>
@@ -12857,25 +12576,12 @@
               <a:buNone/>
             </a:pPr>
             <a:r>
-              <a:rPr lang="fr-FR" sz="2400" kern="0" dirty="0" smtClean="0">
-                <a:latin typeface="Courier New" panose="02070309020205020404" pitchFamily="49" charset="0"/>
-                <a:cs typeface="Courier New" panose="02070309020205020404" pitchFamily="49" charset="0"/>
-                <a:sym typeface="Wingdings" panose="05000000000000000000" pitchFamily="2" charset="2"/>
-              </a:rPr>
-              <a:t>1</a:t>
-            </a:r>
-          </a:p>
-          <a:p>
-            <a:pPr marL="0" indent="0">
-              <a:buNone/>
-            </a:pPr>
-            <a:r>
               <a:rPr lang="fr-FR" sz="2400" kern="0" dirty="0">
                 <a:latin typeface="Courier New" panose="02070309020205020404" pitchFamily="49" charset="0"/>
                 <a:cs typeface="Courier New" panose="02070309020205020404" pitchFamily="49" charset="0"/>
                 <a:sym typeface="Wingdings" panose="05000000000000000000" pitchFamily="2" charset="2"/>
               </a:rPr>
-              <a:t>2</a:t>
+              <a:t>1</a:t>
             </a:r>
           </a:p>
           <a:p>
@@ -12998,7 +12704,7 @@
     </p:spTree>
     <p:extLst>
       <p:ext uri="{BB962C8B-B14F-4D97-AF65-F5344CB8AC3E}">
-        <p14:creationId xmlns:p14="http://schemas.microsoft.com/office/powerpoint/2010/main" val="2185123115"/>
+        <p14:creationId xmlns:p14="http://schemas.microsoft.com/office/powerpoint/2010/main" val="3382327983"/>
       </p:ext>
     </p:extLst>
   </p:cSld>
@@ -13026,10 +12732,13 @@
                             </p:stCondLst>
                             <p:childTnLst>
                               <p:par>
-                                <p:cTn id="5" presetID="10" presetClass="entr" presetSubtype="0" fill="hold" nodeType="clickEffect">
+                                <p:cTn id="5" presetID="1" presetClass="entr" presetSubtype="0" fill="hold" nodeType="clickEffect">
                                   <p:stCondLst>
                                     <p:cond delay="0"/>
                                   </p:stCondLst>
+                                  <p:iterate type="lt">
+                                    <p:tmAbs val="100"/>
+                                  </p:iterate>
                                   <p:childTnLst>
                                     <p:set>
                                       <p:cBhvr>
@@ -13053,18 +12762,6 @@
                                         <p:strVal val="visible"/>
                                       </p:to>
                                     </p:set>
-                                    <p:animEffect transition="in" filter="fade">
-                                      <p:cBhvr>
-                                        <p:cTn id="7" dur="500"/>
-                                        <p:tgtEl>
-                                          <p:spTgt spid="3">
-                                            <p:txEl>
-                                              <p:pRg st="0" end="0"/>
-                                            </p:txEl>
-                                          </p:spTgt>
-                                        </p:tgtEl>
-                                      </p:cBhvr>
-                                    </p:animEffect>
                                   </p:childTnLst>
                                 </p:cTn>
                               </p:par>
@@ -13075,26 +12772,29 @@
                     </p:cTn>
                   </p:par>
                   <p:par>
-                    <p:cTn id="8" fill="hold">
+                    <p:cTn id="7" fill="hold">
                       <p:stCondLst>
                         <p:cond delay="indefinite"/>
                       </p:stCondLst>
                       <p:childTnLst>
                         <p:par>
-                          <p:cTn id="9" fill="hold">
+                          <p:cTn id="8" fill="hold">
                             <p:stCondLst>
                               <p:cond delay="0"/>
                             </p:stCondLst>
                             <p:childTnLst>
                               <p:par>
-                                <p:cTn id="10" presetID="10" presetClass="entr" presetSubtype="0" fill="hold" nodeType="clickEffect">
+                                <p:cTn id="9" presetID="1" presetClass="entr" presetSubtype="0" fill="hold" nodeType="clickEffect">
                                   <p:stCondLst>
                                     <p:cond delay="0"/>
                                   </p:stCondLst>
+                                  <p:iterate type="lt">
+                                    <p:tmAbs val="100"/>
+                                  </p:iterate>
                                   <p:childTnLst>
                                     <p:set>
                                       <p:cBhvr>
-                                        <p:cTn id="11" dur="1" fill="hold">
+                                        <p:cTn id="10" dur="1" fill="hold">
                                           <p:stCondLst>
                                             <p:cond delay="0"/>
                                           </p:stCondLst>
@@ -13114,30 +12814,30 @@
                                         <p:strVal val="visible"/>
                                       </p:to>
                                     </p:set>
-                                    <p:animEffect transition="in" filter="fade">
-                                      <p:cBhvr>
-                                        <p:cTn id="12" dur="500"/>
-                                        <p:tgtEl>
-                                          <p:spTgt spid="3">
-                                            <p:txEl>
-                                              <p:pRg st="1" end="1"/>
-                                            </p:txEl>
-                                          </p:spTgt>
-                                        </p:tgtEl>
-                                      </p:cBhvr>
-                                    </p:animEffect>
                                   </p:childTnLst>
                                 </p:cTn>
                               </p:par>
+                            </p:childTnLst>
+                          </p:cTn>
+                        </p:par>
+                        <p:par>
+                          <p:cTn id="11" fill="hold">
+                            <p:stCondLst>
+                              <p:cond delay="601"/>
+                            </p:stCondLst>
+                            <p:childTnLst>
                               <p:par>
-                                <p:cTn id="13" presetID="10" presetClass="entr" presetSubtype="0" fill="hold" nodeType="withEffect">
+                                <p:cTn id="12" presetID="1" presetClass="entr" presetSubtype="0" fill="hold" nodeType="afterEffect">
                                   <p:stCondLst>
                                     <p:cond delay="0"/>
                                   </p:stCondLst>
+                                  <p:iterate type="lt">
+                                    <p:tmAbs val="100"/>
+                                  </p:iterate>
                                   <p:childTnLst>
                                     <p:set>
                                       <p:cBhvr>
-                                        <p:cTn id="14" dur="1" fill="hold">
+                                        <p:cTn id="13" dur="1" fill="hold">
                                           <p:stCondLst>
                                             <p:cond delay="0"/>
                                           </p:stCondLst>
@@ -13157,18 +12857,6 @@
                                         <p:strVal val="visible"/>
                                       </p:to>
                                     </p:set>
-                                    <p:animEffect transition="in" filter="fade">
-                                      <p:cBhvr>
-                                        <p:cTn id="15" dur="500"/>
-                                        <p:tgtEl>
-                                          <p:spTgt spid="3">
-                                            <p:txEl>
-                                              <p:pRg st="2" end="2"/>
-                                            </p:txEl>
-                                          </p:spTgt>
-                                        </p:tgtEl>
-                                      </p:cBhvr>
-                                    </p:animEffect>
                                   </p:childTnLst>
                                 </p:cTn>
                               </p:par>
@@ -13179,26 +12867,29 @@
                     </p:cTn>
                   </p:par>
                   <p:par>
-                    <p:cTn id="16" fill="hold">
+                    <p:cTn id="14" fill="hold">
                       <p:stCondLst>
                         <p:cond delay="indefinite"/>
                       </p:stCondLst>
                       <p:childTnLst>
                         <p:par>
-                          <p:cTn id="17" fill="hold">
+                          <p:cTn id="15" fill="hold">
                             <p:stCondLst>
                               <p:cond delay="0"/>
                             </p:stCondLst>
                             <p:childTnLst>
                               <p:par>
-                                <p:cTn id="18" presetID="10" presetClass="entr" presetSubtype="0" fill="hold" nodeType="clickEffect">
+                                <p:cTn id="16" presetID="1" presetClass="entr" presetSubtype="0" fill="hold" nodeType="clickEffect">
                                   <p:stCondLst>
                                     <p:cond delay="0"/>
                                   </p:stCondLst>
+                                  <p:iterate type="lt">
+                                    <p:tmAbs val="100"/>
+                                  </p:iterate>
                                   <p:childTnLst>
                                     <p:set>
                                       <p:cBhvr>
-                                        <p:cTn id="19" dur="1" fill="hold">
+                                        <p:cTn id="17" dur="1" fill="hold">
                                           <p:stCondLst>
                                             <p:cond delay="0"/>
                                           </p:stCondLst>
@@ -13218,30 +12909,30 @@
                                         <p:strVal val="visible"/>
                                       </p:to>
                                     </p:set>
-                                    <p:animEffect transition="in" filter="fade">
-                                      <p:cBhvr>
-                                        <p:cTn id="20" dur="500"/>
-                                        <p:tgtEl>
-                                          <p:spTgt spid="3">
-                                            <p:txEl>
-                                              <p:pRg st="3" end="3"/>
-                                            </p:txEl>
-                                          </p:spTgt>
-                                        </p:tgtEl>
-                                      </p:cBhvr>
-                                    </p:animEffect>
                                   </p:childTnLst>
                                 </p:cTn>
                               </p:par>
+                            </p:childTnLst>
+                          </p:cTn>
+                        </p:par>
+                        <p:par>
+                          <p:cTn id="18" fill="hold">
+                            <p:stCondLst>
+                              <p:cond delay="601"/>
+                            </p:stCondLst>
+                            <p:childTnLst>
                               <p:par>
-                                <p:cTn id="21" presetID="10" presetClass="entr" presetSubtype="0" fill="hold" nodeType="withEffect">
+                                <p:cTn id="19" presetID="1" presetClass="entr" presetSubtype="0" fill="hold" nodeType="afterEffect">
                                   <p:stCondLst>
                                     <p:cond delay="0"/>
                                   </p:stCondLst>
+                                  <p:iterate type="lt">
+                                    <p:tmAbs val="100"/>
+                                  </p:iterate>
                                   <p:childTnLst>
                                     <p:set>
                                       <p:cBhvr>
-                                        <p:cTn id="22" dur="1" fill="hold">
+                                        <p:cTn id="20" dur="1" fill="hold">
                                           <p:stCondLst>
                                             <p:cond delay="0"/>
                                           </p:stCondLst>
@@ -13261,30 +12952,39 @@
                                         <p:strVal val="visible"/>
                                       </p:to>
                                     </p:set>
-                                    <p:animEffect transition="in" filter="fade">
-                                      <p:cBhvr>
-                                        <p:cTn id="23" dur="500"/>
-                                        <p:tgtEl>
-                                          <p:spTgt spid="3">
-                                            <p:txEl>
-                                              <p:pRg st="4" end="4"/>
-                                            </p:txEl>
-                                          </p:spTgt>
-                                        </p:tgtEl>
-                                      </p:cBhvr>
-                                    </p:animEffect>
                                   </p:childTnLst>
                                 </p:cTn>
                               </p:par>
+                            </p:childTnLst>
+                          </p:cTn>
+                        </p:par>
+                      </p:childTnLst>
+                    </p:cTn>
+                  </p:par>
+                  <p:par>
+                    <p:cTn id="21" fill="hold">
+                      <p:stCondLst>
+                        <p:cond delay="indefinite"/>
+                      </p:stCondLst>
+                      <p:childTnLst>
+                        <p:par>
+                          <p:cTn id="22" fill="hold">
+                            <p:stCondLst>
+                              <p:cond delay="0"/>
+                            </p:stCondLst>
+                            <p:childTnLst>
                               <p:par>
-                                <p:cTn id="24" presetID="10" presetClass="entr" presetSubtype="0" fill="hold" nodeType="withEffect">
+                                <p:cTn id="23" presetID="1" presetClass="entr" presetSubtype="0" fill="hold" nodeType="clickEffect">
                                   <p:stCondLst>
                                     <p:cond delay="0"/>
                                   </p:stCondLst>
+                                  <p:iterate type="lt">
+                                    <p:tmAbs val="100"/>
+                                  </p:iterate>
                                   <p:childTnLst>
                                     <p:set>
                                       <p:cBhvr>
-                                        <p:cTn id="25" dur="1" fill="hold">
+                                        <p:cTn id="24" dur="1" fill="hold">
                                           <p:stCondLst>
                                             <p:cond delay="0"/>
                                           </p:stCondLst>
@@ -13304,18 +13004,6 @@
                                         <p:strVal val="visible"/>
                                       </p:to>
                                     </p:set>
-                                    <p:animEffect transition="in" filter="fade">
-                                      <p:cBhvr>
-                                        <p:cTn id="26" dur="500"/>
-                                        <p:tgtEl>
-                                          <p:spTgt spid="3">
-                                            <p:txEl>
-                                              <p:pRg st="5" end="5"/>
-                                            </p:txEl>
-                                          </p:spTgt>
-                                        </p:tgtEl>
-                                      </p:cBhvr>
-                                    </p:animEffect>
                                   </p:childTnLst>
                                 </p:cTn>
                               </p:par>
@@ -13326,26 +13014,29 @@
                     </p:cTn>
                   </p:par>
                   <p:par>
-                    <p:cTn id="27" fill="hold">
+                    <p:cTn id="25" fill="hold">
                       <p:stCondLst>
                         <p:cond delay="indefinite"/>
                       </p:stCondLst>
                       <p:childTnLst>
                         <p:par>
-                          <p:cTn id="28" fill="hold">
+                          <p:cTn id="26" fill="hold">
                             <p:stCondLst>
                               <p:cond delay="0"/>
                             </p:stCondLst>
                             <p:childTnLst>
                               <p:par>
-                                <p:cTn id="29" presetID="10" presetClass="entr" presetSubtype="0" fill="hold" nodeType="clickEffect">
+                                <p:cTn id="27" presetID="1" presetClass="entr" presetSubtype="0" fill="hold" nodeType="clickEffect">
                                   <p:stCondLst>
                                     <p:cond delay="0"/>
                                   </p:stCondLst>
+                                  <p:iterate type="lt">
+                                    <p:tmAbs val="100"/>
+                                  </p:iterate>
                                   <p:childTnLst>
                                     <p:set>
                                       <p:cBhvr>
-                                        <p:cTn id="30" dur="1" fill="hold">
+                                        <p:cTn id="28" dur="1" fill="hold">
                                           <p:stCondLst>
                                             <p:cond delay="0"/>
                                           </p:stCondLst>
@@ -13365,18 +13056,6 @@
                                         <p:strVal val="visible"/>
                                       </p:to>
                                     </p:set>
-                                    <p:animEffect transition="in" filter="fade">
-                                      <p:cBhvr>
-                                        <p:cTn id="31" dur="500"/>
-                                        <p:tgtEl>
-                                          <p:spTgt spid="3">
-                                            <p:txEl>
-                                              <p:pRg st="6" end="6"/>
-                                            </p:txEl>
-                                          </p:spTgt>
-                                        </p:tgtEl>
-                                      </p:cBhvr>
-                                    </p:animEffect>
                                   </p:childTnLst>
                                 </p:cTn>
                               </p:par>
@@ -13387,26 +13066,26 @@
                     </p:cTn>
                   </p:par>
                   <p:par>
-                    <p:cTn id="32" fill="hold">
+                    <p:cTn id="29" fill="hold">
                       <p:stCondLst>
                         <p:cond delay="indefinite"/>
                       </p:stCondLst>
                       <p:childTnLst>
                         <p:par>
-                          <p:cTn id="33" fill="hold">
+                          <p:cTn id="30" fill="hold">
                             <p:stCondLst>
                               <p:cond delay="0"/>
                             </p:stCondLst>
                             <p:childTnLst>
                               <p:par>
-                                <p:cTn id="34" presetID="10" presetClass="entr" presetSubtype="0" fill="hold" nodeType="clickEffect">
+                                <p:cTn id="31" presetID="10" presetClass="entr" presetSubtype="0" fill="hold" nodeType="clickEffect">
                                   <p:stCondLst>
                                     <p:cond delay="0"/>
                                   </p:stCondLst>
                                   <p:childTnLst>
                                     <p:set>
                                       <p:cBhvr>
-                                        <p:cTn id="35" dur="1" fill="hold">
+                                        <p:cTn id="32" dur="1" fill="hold">
                                           <p:stCondLst>
                                             <p:cond delay="0"/>
                                           </p:stCondLst>
@@ -13428,11 +13107,54 @@
                                     </p:set>
                                     <p:animEffect transition="in" filter="fade">
                                       <p:cBhvr>
+                                        <p:cTn id="33" dur="500"/>
+                                        <p:tgtEl>
+                                          <p:spTgt spid="4">
+                                            <p:txEl>
+                                              <p:pRg st="0" end="0"/>
+                                            </p:txEl>
+                                          </p:spTgt>
+                                        </p:tgtEl>
+                                      </p:cBhvr>
+                                    </p:animEffect>
+                                  </p:childTnLst>
+                                </p:cTn>
+                              </p:par>
+                              <p:par>
+                                <p:cTn id="34" presetID="10" presetClass="entr" presetSubtype="0" fill="hold" nodeType="withEffect">
+                                  <p:stCondLst>
+                                    <p:cond delay="0"/>
+                                  </p:stCondLst>
+                                  <p:childTnLst>
+                                    <p:set>
+                                      <p:cBhvr>
+                                        <p:cTn id="35" dur="1" fill="hold">
+                                          <p:stCondLst>
+                                            <p:cond delay="0"/>
+                                          </p:stCondLst>
+                                        </p:cTn>
+                                        <p:tgtEl>
+                                          <p:spTgt spid="4">
+                                            <p:txEl>
+                                              <p:pRg st="1" end="1"/>
+                                            </p:txEl>
+                                          </p:spTgt>
+                                        </p:tgtEl>
+                                        <p:attrNameLst>
+                                          <p:attrName>style.visibility</p:attrName>
+                                        </p:attrNameLst>
+                                      </p:cBhvr>
+                                      <p:to>
+                                        <p:strVal val="visible"/>
+                                      </p:to>
+                                    </p:set>
+                                    <p:animEffect transition="in" filter="fade">
+                                      <p:cBhvr>
                                         <p:cTn id="36" dur="500"/>
                                         <p:tgtEl>
                                           <p:spTgt spid="4">
                                             <p:txEl>
-                                              <p:pRg st="0" end="0"/>
+                                              <p:pRg st="1" end="1"/>
                                             </p:txEl>
                                           </p:spTgt>
                                         </p:tgtEl>
@@ -13457,7 +13179,7 @@
                                         <p:tgtEl>
                                           <p:spTgt spid="4">
                                             <p:txEl>
-                                              <p:pRg st="1" end="1"/>
+                                              <p:pRg st="2" end="2"/>
                                             </p:txEl>
                                           </p:spTgt>
                                         </p:tgtEl>
@@ -13475,93 +13197,7 @@
                                         <p:tgtEl>
                                           <p:spTgt spid="4">
                                             <p:txEl>
-                                              <p:pRg st="1" end="1"/>
-                                            </p:txEl>
-                                          </p:spTgt>
-                                        </p:tgtEl>
-                                      </p:cBhvr>
-                                    </p:animEffect>
-                                  </p:childTnLst>
-                                </p:cTn>
-                              </p:par>
-                              <p:par>
-                                <p:cTn id="40" presetID="10" presetClass="entr" presetSubtype="0" fill="hold" nodeType="withEffect">
-                                  <p:stCondLst>
-                                    <p:cond delay="0"/>
-                                  </p:stCondLst>
-                                  <p:childTnLst>
-                                    <p:set>
-                                      <p:cBhvr>
-                                        <p:cTn id="41" dur="1" fill="hold">
-                                          <p:stCondLst>
-                                            <p:cond delay="0"/>
-                                          </p:stCondLst>
-                                        </p:cTn>
-                                        <p:tgtEl>
-                                          <p:spTgt spid="4">
-                                            <p:txEl>
                                               <p:pRg st="2" end="2"/>
-                                            </p:txEl>
-                                          </p:spTgt>
-                                        </p:tgtEl>
-                                        <p:attrNameLst>
-                                          <p:attrName>style.visibility</p:attrName>
-                                        </p:attrNameLst>
-                                      </p:cBhvr>
-                                      <p:to>
-                                        <p:strVal val="visible"/>
-                                      </p:to>
-                                    </p:set>
-                                    <p:animEffect transition="in" filter="fade">
-                                      <p:cBhvr>
-                                        <p:cTn id="42" dur="500"/>
-                                        <p:tgtEl>
-                                          <p:spTgt spid="4">
-                                            <p:txEl>
-                                              <p:pRg st="2" end="2"/>
-                                            </p:txEl>
-                                          </p:spTgt>
-                                        </p:tgtEl>
-                                      </p:cBhvr>
-                                    </p:animEffect>
-                                  </p:childTnLst>
-                                </p:cTn>
-                              </p:par>
-                              <p:par>
-                                <p:cTn id="43" presetID="10" presetClass="entr" presetSubtype="0" fill="hold" nodeType="withEffect">
-                                  <p:stCondLst>
-                                    <p:cond delay="0"/>
-                                  </p:stCondLst>
-                                  <p:childTnLst>
-                                    <p:set>
-                                      <p:cBhvr>
-                                        <p:cTn id="44" dur="1" fill="hold">
-                                          <p:stCondLst>
-                                            <p:cond delay="0"/>
-                                          </p:stCondLst>
-                                        </p:cTn>
-                                        <p:tgtEl>
-                                          <p:spTgt spid="4">
-                                            <p:txEl>
-                                              <p:pRg st="3" end="3"/>
-                                            </p:txEl>
-                                          </p:spTgt>
-                                        </p:tgtEl>
-                                        <p:attrNameLst>
-                                          <p:attrName>style.visibility</p:attrName>
-                                        </p:attrNameLst>
-                                      </p:cBhvr>
-                                      <p:to>
-                                        <p:strVal val="visible"/>
-                                      </p:to>
-                                    </p:set>
-                                    <p:animEffect transition="in" filter="fade">
-                                      <p:cBhvr>
-                                        <p:cTn id="45" dur="500"/>
-                                        <p:tgtEl>
-                                          <p:spTgt spid="4">
-                                            <p:txEl>
-                                              <p:pRg st="3" end="3"/>
                                             </p:txEl>
                                           </p:spTgt>
                                         </p:tgtEl>

</xml_diff>